<commit_message>
updated powerpoint, makefile and project setup
</commit_message>
<xml_diff>
--- a/doc/versionControl.pptx
+++ b/doc/versionControl.pptx
@@ -5,7 +5,7 @@
     <p:sldMasterId id="2147483660" r:id="rId4"/>
   </p:sldMasterIdLst>
   <p:notesMasterIdLst>
-    <p:notesMasterId r:id="rId19"/>
+    <p:notesMasterId r:id="rId22"/>
   </p:notesMasterIdLst>
   <p:sldIdLst>
     <p:sldId id="459" r:id="rId5"/>
@@ -22,6 +22,9 @@
     <p:sldId id="730" r:id="rId16"/>
     <p:sldId id="731" r:id="rId17"/>
     <p:sldId id="732" r:id="rId18"/>
+    <p:sldId id="733" r:id="rId19"/>
+    <p:sldId id="734" r:id="rId20"/>
+    <p:sldId id="735" r:id="rId21"/>
   </p:sldIdLst>
   <p:sldSz cx="9144000" cy="6858000" type="screen4x3"/>
   <p:notesSz cx="7010400" cy="9296400"/>
@@ -7966,11 +7969,7 @@
             <a:pPr lvl="1"/>
             <a:r>
               <a:rPr lang="en-US" dirty="0" smtClean="0"/>
-              <a:t>Advanced workflows possible – following software design </a:t>
-            </a:r>
-            <a:r>
-              <a:rPr lang="en-US" dirty="0" smtClean="0"/>
-              <a:t>models</a:t>
+              <a:t>Advanced workflows possible – following software design models</a:t>
             </a:r>
           </a:p>
         </p:txBody>
@@ -8519,7 +8518,15 @@
             </a:r>
             <a:r>
               <a:rPr lang="en-US" baseline="0" dirty="0" smtClean="0"/>
-              <a:t> with 2 targets:</a:t>
+              <a:t> with </a:t>
+            </a:r>
+            <a:r>
+              <a:rPr lang="en-US" baseline="0" dirty="0" smtClean="0"/>
+              <a:t>3 </a:t>
+            </a:r>
+            <a:r>
+              <a:rPr lang="en-US" baseline="0" dirty="0" smtClean="0"/>
+              <a:t>targets:</a:t>
             </a:r>
           </a:p>
           <a:p>
@@ -8530,8 +8537,24 @@
             </a:r>
             <a:r>
               <a:rPr lang="en-US" baseline="0" dirty="0" smtClean="0"/>
-              <a:t> a project with remote sources</a:t>
-            </a:r>
+              <a:t> a project with remote </a:t>
+            </a:r>
+            <a:r>
+              <a:rPr lang="en-US" baseline="0" dirty="0" smtClean="0"/>
+              <a:t>sources</a:t>
+            </a:r>
+          </a:p>
+          <a:p>
+            <a:pPr lvl="1"/>
+            <a:r>
+              <a:rPr lang="en-US" baseline="0" dirty="0" smtClean="0"/>
+              <a:t>Compile opens the project and launches run to </a:t>
+            </a:r>
+            <a:r>
+              <a:rPr lang="en-US" baseline="0" dirty="0" err="1" smtClean="0"/>
+              <a:t>bitstream</a:t>
+            </a:r>
+            <a:endParaRPr lang="en-US" baseline="0" dirty="0" smtClean="0"/>
           </a:p>
           <a:p>
             <a:pPr lvl="1"/>
@@ -8818,7 +8841,75 @@
               <a:rPr lang="en-US" baseline="0" dirty="0" smtClean="0"/>
               <a:t> </a:t>
             </a:r>
-            <a:endParaRPr lang="en-US" dirty="0"/>
+            <a:r>
+              <a:rPr lang="en-US" baseline="0" dirty="0" smtClean="0"/>
+              <a:t>to generate the BD</a:t>
+            </a:r>
+          </a:p>
+          <a:p>
+            <a:pPr lvl="1"/>
+            <a:r>
+              <a:rPr lang="en-US" dirty="0" smtClean="0"/>
+              <a:t>Modify the </a:t>
+            </a:r>
+            <a:r>
+              <a:rPr lang="en-US" dirty="0" err="1" smtClean="0"/>
+              <a:t>tcl</a:t>
+            </a:r>
+            <a:r>
+              <a:rPr lang="en-US" dirty="0" smtClean="0"/>
+              <a:t> to create the </a:t>
+            </a:r>
+            <a:r>
+              <a:rPr lang="en-US" dirty="0" err="1" smtClean="0"/>
+              <a:t>bd</a:t>
+            </a:r>
+            <a:r>
+              <a:rPr lang="en-US" dirty="0" smtClean="0"/>
+              <a:t> “remote” to project</a:t>
+            </a:r>
+          </a:p>
+          <a:p>
+            <a:pPr lvl="0"/>
+            <a:r>
+              <a:rPr lang="en-US" dirty="0" smtClean="0"/>
+              <a:t>Add a </a:t>
+            </a:r>
+            <a:r>
+              <a:rPr lang="en-US" dirty="0" err="1" smtClean="0"/>
+              <a:t>bd</a:t>
+            </a:r>
+            <a:r>
+              <a:rPr lang="en-US" dirty="0" smtClean="0"/>
+              <a:t> generation target in </a:t>
+            </a:r>
+            <a:r>
+              <a:rPr lang="en-US" dirty="0" err="1" smtClean="0"/>
+              <a:t>makefile</a:t>
+            </a:r>
+            <a:endParaRPr lang="en-US" dirty="0" smtClean="0"/>
+          </a:p>
+          <a:p>
+            <a:pPr lvl="0"/>
+            <a:r>
+              <a:rPr lang="en-US" dirty="0" smtClean="0"/>
+              <a:t>Take the output of the generation (the remote </a:t>
+            </a:r>
+            <a:r>
+              <a:rPr lang="en-US" dirty="0" err="1" smtClean="0"/>
+              <a:t>bd</a:t>
+            </a:r>
+            <a:r>
+              <a:rPr lang="en-US" dirty="0" smtClean="0"/>
+              <a:t>) and check in to revision control</a:t>
+            </a:r>
+          </a:p>
+          <a:p>
+            <a:pPr lvl="0"/>
+            <a:r>
+              <a:rPr lang="en-US" dirty="0" smtClean="0"/>
+              <a:t>Iterate on a small change</a:t>
+            </a:r>
           </a:p>
         </p:txBody>
       </p:sp>
@@ -8853,6 +8944,410 @@
     <p:extLst>
       <p:ext uri="{BB962C8B-B14F-4D97-AF65-F5344CB8AC3E}">
         <p14:creationId xmlns:p14="http://schemas.microsoft.com/office/powerpoint/2010/main" val="938986884"/>
+      </p:ext>
+    </p:extLst>
+  </p:cSld>
+  <p:clrMapOvr>
+    <a:masterClrMapping/>
+  </p:clrMapOvr>
+</p:sld>
+</file>
+
+<file path=ppt/slides/slide15.xml><?xml version="1.0" encoding="utf-8"?>
+<p:sld xmlns:a="http://schemas.openxmlformats.org/drawingml/2006/main" xmlns:r="http://schemas.openxmlformats.org/officeDocument/2006/relationships" xmlns:p="http://schemas.openxmlformats.org/presentationml/2006/main">
+  <p:cSld>
+    <p:spTree>
+      <p:nvGrpSpPr>
+        <p:cNvPr id="1" name=""/>
+        <p:cNvGrpSpPr/>
+        <p:nvPr/>
+      </p:nvGrpSpPr>
+      <p:grpSpPr>
+        <a:xfrm>
+          <a:off x="0" y="0"/>
+          <a:ext cx="0" cy="0"/>
+          <a:chOff x="0" y="0"/>
+          <a:chExt cx="0" cy="0"/>
+        </a:xfrm>
+      </p:grpSpPr>
+      <p:sp>
+        <p:nvSpPr>
+          <p:cNvPr id="2" name="Content Placeholder 1"/>
+          <p:cNvSpPr>
+            <a:spLocks noGrp="1"/>
+          </p:cNvSpPr>
+          <p:nvPr>
+            <p:ph idx="1"/>
+          </p:nvPr>
+        </p:nvSpPr>
+        <p:spPr/>
+        <p:txBody>
+          <a:bodyPr/>
+          <a:lstStyle/>
+          <a:p>
+            <a:r>
+              <a:rPr lang="en-US" dirty="0" smtClean="0"/>
+              <a:t>Package up custom IP RTL for IPI</a:t>
+            </a:r>
+          </a:p>
+          <a:p>
+            <a:pPr lvl="1"/>
+            <a:r>
+              <a:rPr lang="en-US" dirty="0" smtClean="0"/>
+              <a:t>Using</a:t>
+            </a:r>
+            <a:r>
+              <a:rPr lang="en-US" baseline="0" dirty="0" smtClean="0"/>
+              <a:t> the </a:t>
+            </a:r>
+            <a:r>
+              <a:rPr lang="en-US" baseline="0" dirty="0" err="1" smtClean="0"/>
+              <a:t>bft</a:t>
+            </a:r>
+            <a:r>
+              <a:rPr lang="en-US" baseline="0" dirty="0" smtClean="0"/>
+              <a:t> RTL</a:t>
+            </a:r>
+          </a:p>
+          <a:p>
+            <a:pPr lvl="0"/>
+            <a:r>
+              <a:rPr lang="en-US" dirty="0" smtClean="0"/>
+              <a:t>Build a script to create a small project</a:t>
+            </a:r>
+          </a:p>
+          <a:p>
+            <a:pPr lvl="1"/>
+            <a:r>
+              <a:rPr lang="en-US" dirty="0" smtClean="0"/>
+              <a:t>For packaging purposes</a:t>
+            </a:r>
+          </a:p>
+          <a:p>
+            <a:pPr lvl="0"/>
+            <a:r>
+              <a:rPr lang="en-US" dirty="0" smtClean="0"/>
+              <a:t>Take the output</a:t>
+            </a:r>
+            <a:r>
+              <a:rPr lang="en-US" baseline="0" dirty="0" smtClean="0"/>
+              <a:t> directory – check into revision control</a:t>
+            </a:r>
+          </a:p>
+          <a:p>
+            <a:pPr lvl="0"/>
+            <a:r>
+              <a:rPr lang="en-US" baseline="0" dirty="0" smtClean="0"/>
+              <a:t>Edit from within BD to change the RTL</a:t>
+            </a:r>
+          </a:p>
+          <a:p>
+            <a:pPr lvl="1"/>
+            <a:r>
+              <a:rPr lang="en-US" dirty="0" smtClean="0"/>
+              <a:t>Check in changes into </a:t>
+            </a:r>
+            <a:r>
+              <a:rPr lang="en-US" dirty="0" err="1" smtClean="0"/>
+              <a:t>git</a:t>
+            </a:r>
+            <a:endParaRPr lang="en-US" dirty="0" smtClean="0"/>
+          </a:p>
+          <a:p>
+            <a:pPr lvl="1"/>
+            <a:r>
+              <a:rPr lang="en-US" dirty="0" smtClean="0"/>
+              <a:t>Make sure and change version so update</a:t>
+            </a:r>
+            <a:r>
+              <a:rPr lang="en-US" baseline="0" dirty="0" smtClean="0"/>
+              <a:t> is automated</a:t>
+            </a:r>
+          </a:p>
+        </p:txBody>
+      </p:sp>
+      <p:sp>
+        <p:nvSpPr>
+          <p:cNvPr id="3" name="Title 2"/>
+          <p:cNvSpPr>
+            <a:spLocks noGrp="1"/>
+          </p:cNvSpPr>
+          <p:nvPr>
+            <p:ph type="title"/>
+          </p:nvPr>
+        </p:nvSpPr>
+        <p:spPr/>
+        <p:txBody>
+          <a:bodyPr/>
+          <a:lstStyle/>
+          <a:p>
+            <a:r>
+              <a:rPr lang="en-US" dirty="0" smtClean="0"/>
+              <a:t>Lab 4</a:t>
+            </a:r>
+            <a:endParaRPr lang="en-US" dirty="0"/>
+          </a:p>
+        </p:txBody>
+      </p:sp>
+    </p:spTree>
+    <p:extLst>
+      <p:ext uri="{BB962C8B-B14F-4D97-AF65-F5344CB8AC3E}">
+        <p14:creationId xmlns:p14="http://schemas.microsoft.com/office/powerpoint/2010/main" val="1366474437"/>
+      </p:ext>
+    </p:extLst>
+  </p:cSld>
+  <p:clrMapOvr>
+    <a:masterClrMapping/>
+  </p:clrMapOvr>
+</p:sld>
+</file>
+
+<file path=ppt/slides/slide16.xml><?xml version="1.0" encoding="utf-8"?>
+<p:sld xmlns:a="http://schemas.openxmlformats.org/drawingml/2006/main" xmlns:r="http://schemas.openxmlformats.org/officeDocument/2006/relationships" xmlns:p="http://schemas.openxmlformats.org/presentationml/2006/main">
+  <p:cSld>
+    <p:spTree>
+      <p:nvGrpSpPr>
+        <p:cNvPr id="1" name=""/>
+        <p:cNvGrpSpPr/>
+        <p:nvPr/>
+      </p:nvGrpSpPr>
+      <p:grpSpPr>
+        <a:xfrm>
+          <a:off x="0" y="0"/>
+          <a:ext cx="0" cy="0"/>
+          <a:chOff x="0" y="0"/>
+          <a:chExt cx="0" cy="0"/>
+        </a:xfrm>
+      </p:grpSpPr>
+      <p:sp>
+        <p:nvSpPr>
+          <p:cNvPr id="2" name="Content Placeholder 1"/>
+          <p:cNvSpPr>
+            <a:spLocks noGrp="1"/>
+          </p:cNvSpPr>
+          <p:nvPr>
+            <p:ph idx="1"/>
+          </p:nvPr>
+        </p:nvSpPr>
+        <p:spPr/>
+        <p:txBody>
+          <a:bodyPr/>
+          <a:lstStyle/>
+          <a:p>
+            <a:r>
+              <a:rPr lang="en-US" dirty="0" smtClean="0"/>
+              <a:t>Build HLS-Based IP from C++ Sources</a:t>
+            </a:r>
+          </a:p>
+          <a:p>
+            <a:r>
+              <a:rPr lang="en-US" dirty="0" smtClean="0"/>
+              <a:t>Build a script and add a make target</a:t>
+            </a:r>
+          </a:p>
+          <a:p>
+            <a:r>
+              <a:rPr lang="en-US" dirty="0" smtClean="0"/>
+              <a:t>Once generated, check in remote</a:t>
+            </a:r>
+            <a:r>
+              <a:rPr lang="en-US" baseline="0" dirty="0" smtClean="0"/>
+              <a:t> IP repository</a:t>
+            </a:r>
+          </a:p>
+        </p:txBody>
+      </p:sp>
+      <p:sp>
+        <p:nvSpPr>
+          <p:cNvPr id="3" name="Title 2"/>
+          <p:cNvSpPr>
+            <a:spLocks noGrp="1"/>
+          </p:cNvSpPr>
+          <p:nvPr>
+            <p:ph type="title"/>
+          </p:nvPr>
+        </p:nvSpPr>
+        <p:spPr/>
+        <p:txBody>
+          <a:bodyPr/>
+          <a:lstStyle/>
+          <a:p>
+            <a:r>
+              <a:rPr lang="en-US" dirty="0" smtClean="0"/>
+              <a:t>Lab 5</a:t>
+            </a:r>
+            <a:endParaRPr lang="en-US" dirty="0"/>
+          </a:p>
+        </p:txBody>
+      </p:sp>
+    </p:spTree>
+    <p:extLst>
+      <p:ext uri="{BB962C8B-B14F-4D97-AF65-F5344CB8AC3E}">
+        <p14:creationId xmlns:p14="http://schemas.microsoft.com/office/powerpoint/2010/main" val="2011301132"/>
+      </p:ext>
+    </p:extLst>
+  </p:cSld>
+  <p:clrMapOvr>
+    <a:masterClrMapping/>
+  </p:clrMapOvr>
+</p:sld>
+</file>
+
+<file path=ppt/slides/slide17.xml><?xml version="1.0" encoding="utf-8"?>
+<p:sld xmlns:a="http://schemas.openxmlformats.org/drawingml/2006/main" xmlns:r="http://schemas.openxmlformats.org/officeDocument/2006/relationships" xmlns:p="http://schemas.openxmlformats.org/presentationml/2006/main">
+  <p:cSld>
+    <p:spTree>
+      <p:nvGrpSpPr>
+        <p:cNvPr id="1" name=""/>
+        <p:cNvGrpSpPr/>
+        <p:nvPr/>
+      </p:nvGrpSpPr>
+      <p:grpSpPr>
+        <a:xfrm>
+          <a:off x="0" y="0"/>
+          <a:ext cx="0" cy="0"/>
+          <a:chOff x="0" y="0"/>
+          <a:chExt cx="0" cy="0"/>
+        </a:xfrm>
+      </p:grpSpPr>
+      <p:sp>
+        <p:nvSpPr>
+          <p:cNvPr id="2" name="Content Placeholder 1"/>
+          <p:cNvSpPr>
+            <a:spLocks noGrp="1"/>
+          </p:cNvSpPr>
+          <p:nvPr>
+            <p:ph idx="1"/>
+          </p:nvPr>
+        </p:nvSpPr>
+        <p:spPr/>
+        <p:txBody>
+          <a:bodyPr/>
+          <a:lstStyle/>
+          <a:p>
+            <a:r>
+              <a:rPr lang="en-US" dirty="0" smtClean="0"/>
+              <a:t>Given a System Generator DSP</a:t>
+            </a:r>
+            <a:r>
+              <a:rPr lang="en-US" baseline="0" dirty="0" smtClean="0"/>
+              <a:t> Subsystem</a:t>
+            </a:r>
+          </a:p>
+          <a:p>
+            <a:pPr lvl="1"/>
+            <a:r>
+              <a:rPr lang="en-US" dirty="0" smtClean="0"/>
+              <a:t>Fully generated – no</a:t>
+            </a:r>
+            <a:r>
+              <a:rPr lang="en-US" baseline="0" dirty="0" smtClean="0"/>
+              <a:t> need to have </a:t>
+            </a:r>
+            <a:r>
+              <a:rPr lang="en-US" baseline="0" dirty="0" err="1" smtClean="0"/>
+              <a:t>Matlab</a:t>
+            </a:r>
+            <a:r>
+              <a:rPr lang="en-US" baseline="0" dirty="0" smtClean="0"/>
+              <a:t> licenses</a:t>
+            </a:r>
+            <a:endParaRPr lang="en-US" dirty="0"/>
+          </a:p>
+          <a:p>
+            <a:r>
+              <a:rPr lang="en-US" baseline="0" dirty="0" smtClean="0"/>
+              <a:t>Check</a:t>
+            </a:r>
+            <a:r>
+              <a:rPr lang="en-US" dirty="0" smtClean="0"/>
+              <a:t> in </a:t>
+            </a:r>
+            <a:r>
+              <a:rPr lang="en-US" dirty="0" err="1" smtClean="0"/>
+              <a:t>SysGen</a:t>
+            </a:r>
+            <a:r>
+              <a:rPr lang="en-US" dirty="0" smtClean="0"/>
+              <a:t> module into revision control</a:t>
+            </a:r>
+            <a:endParaRPr lang="en-US" dirty="0"/>
+          </a:p>
+          <a:p>
+            <a:r>
+              <a:rPr lang="en-US" dirty="0" smtClean="0"/>
+              <a:t>Modify setup script and </a:t>
+            </a:r>
+            <a:r>
+              <a:rPr lang="en-US" dirty="0" err="1" smtClean="0"/>
+              <a:t>Makefile</a:t>
+            </a:r>
+            <a:r>
+              <a:rPr lang="en-US" dirty="0" smtClean="0"/>
+              <a:t> to add in </a:t>
+            </a:r>
+            <a:r>
+              <a:rPr lang="en-US" dirty="0" err="1" smtClean="0"/>
+              <a:t>slx</a:t>
+            </a:r>
+            <a:endParaRPr lang="en-US" dirty="0" smtClean="0"/>
+          </a:p>
+          <a:p>
+            <a:r>
+              <a:rPr lang="en-US" dirty="0" smtClean="0"/>
+              <a:t>Verify compilation takes </a:t>
+            </a:r>
+            <a:r>
+              <a:rPr lang="en-US" dirty="0" err="1" smtClean="0"/>
+              <a:t>sysgen</a:t>
+            </a:r>
+            <a:r>
+              <a:rPr lang="en-US" dirty="0" smtClean="0"/>
+              <a:t> </a:t>
+            </a:r>
+            <a:r>
+              <a:rPr lang="en-US" dirty="0" err="1" smtClean="0"/>
+              <a:t>dcp</a:t>
+            </a:r>
+            <a:r>
+              <a:rPr lang="en-US" dirty="0" smtClean="0"/>
+              <a:t> </a:t>
+            </a:r>
+            <a:r>
+              <a:rPr lang="en-US" smtClean="0"/>
+              <a:t>and links</a:t>
+            </a:r>
+            <a:endParaRPr lang="en-US" dirty="0" smtClean="0"/>
+          </a:p>
+        </p:txBody>
+      </p:sp>
+      <p:sp>
+        <p:nvSpPr>
+          <p:cNvPr id="3" name="Title 2"/>
+          <p:cNvSpPr>
+            <a:spLocks noGrp="1"/>
+          </p:cNvSpPr>
+          <p:nvPr>
+            <p:ph type="title"/>
+          </p:nvPr>
+        </p:nvSpPr>
+        <p:spPr/>
+        <p:txBody>
+          <a:bodyPr/>
+          <a:lstStyle/>
+          <a:p>
+            <a:r>
+              <a:rPr lang="en-US" dirty="0" smtClean="0"/>
+              <a:t>Lab 6</a:t>
+            </a:r>
+            <a:endParaRPr lang="en-US" dirty="0"/>
+          </a:p>
+        </p:txBody>
+      </p:sp>
+    </p:spTree>
+    <p:extLst>
+      <p:ext uri="{BB962C8B-B14F-4D97-AF65-F5344CB8AC3E}">
+        <p14:creationId xmlns:p14="http://schemas.microsoft.com/office/powerpoint/2010/main" val="2412175075"/>
       </p:ext>
     </p:extLst>
   </p:cSld>
@@ -13024,6 +13519,21 @@
 </file>
 
 <file path=customXml/item1.xml><?xml version="1.0" encoding="utf-8"?>
+<?mso-contentType ?>
+<FormTemplates xmlns="http://schemas.microsoft.com/sharepoint/v3/contenttype/forms">
+  <Display>DocumentLibraryForm</Display>
+  <Edit>DocumentLibraryForm</Edit>
+  <New>DocumentLibraryForm</New>
+</FormTemplates>
+</file>
+
+<file path=customXml/item2.xml><?xml version="1.0" encoding="utf-8"?>
+<p:properties xmlns:p="http://schemas.microsoft.com/office/2006/metadata/properties" xmlns:xsi="http://www.w3.org/2001/XMLSchema-instance" xmlns:pc="http://schemas.microsoft.com/office/infopath/2007/PartnerControls">
+  <documentManagement/>
+</p:properties>
+</file>
+
+<file path=customXml/item3.xml><?xml version="1.0" encoding="utf-8"?>
 <ct:contentTypeSchema xmlns:ct="http://schemas.microsoft.com/office/2006/metadata/contentType" xmlns:ma="http://schemas.microsoft.com/office/2006/metadata/properties/metaAttributes" ct:_="" ma:_="" ma:contentTypeName="Document" ma:contentTypeID="0x0101009FF7D9ACD620714D8FBB4D60D145DB4F" ma:contentTypeVersion="0" ma:contentTypeDescription="Create a new document." ma:contentTypeScope="" ma:versionID="4bbc07a174f573dfbe0296acaebf4d5b">
   <xsd:schema xmlns:xsd="http://www.w3.org/2001/XMLSchema" xmlns:xs="http://www.w3.org/2001/XMLSchema" xmlns:p="http://schemas.microsoft.com/office/2006/metadata/properties" targetNamespace="http://schemas.microsoft.com/office/2006/metadata/properties" ma:root="true" ma:fieldsID="c64490b4aec6201516c3a874156f37b2">
     <xsd:element name="properties">
@@ -13137,33 +13647,10 @@
 </ct:contentTypeSchema>
 </file>
 
-<file path=customXml/item2.xml><?xml version="1.0" encoding="utf-8"?>
-<p:properties xmlns:p="http://schemas.microsoft.com/office/2006/metadata/properties" xmlns:xsi="http://www.w3.org/2001/XMLSchema-instance" xmlns:pc="http://schemas.microsoft.com/office/infopath/2007/PartnerControls">
-  <documentManagement/>
-</p:properties>
-</file>
-
-<file path=customXml/item3.xml><?xml version="1.0" encoding="utf-8"?>
-<?mso-contentType ?>
-<FormTemplates xmlns="http://schemas.microsoft.com/sharepoint/v3/contenttype/forms">
-  <Display>DocumentLibraryForm</Display>
-  <Edit>DocumentLibraryForm</Edit>
-  <New>DocumentLibraryForm</New>
-</FormTemplates>
-</file>
-
 <file path=customXml/itemProps1.xml><?xml version="1.0" encoding="utf-8"?>
-<ds:datastoreItem xmlns:ds="http://schemas.openxmlformats.org/officeDocument/2006/customXml" ds:itemID="{63A6CF10-4272-4792-86D6-C2A00A3F8DBF}">
+<ds:datastoreItem xmlns:ds="http://schemas.openxmlformats.org/officeDocument/2006/customXml" ds:itemID="{56EA677F-09E4-40FC-B998-315C6F85D97B}">
   <ds:schemaRefs>
-    <ds:schemaRef ds:uri="http://schemas.microsoft.com/office/2006/metadata/contentType"/>
-    <ds:schemaRef ds:uri="http://schemas.microsoft.com/office/2006/metadata/properties/metaAttributes"/>
-    <ds:schemaRef ds:uri="http://www.w3.org/2001/XMLSchema"/>
-    <ds:schemaRef ds:uri="http://schemas.microsoft.com/office/2006/metadata/properties"/>
-    <ds:schemaRef ds:uri="http://schemas.openxmlformats.org/package/2006/metadata/core-properties"/>
-    <ds:schemaRef ds:uri="http://purl.org/dc/elements/1.1/"/>
-    <ds:schemaRef ds:uri="http://purl.org/dc/terms/"/>
-    <ds:schemaRef ds:uri="http://schemas.microsoft.com/internal/obd"/>
-    <ds:schemaRef ds:uri="http://schemas.microsoft.com/office/infopath/2007/PartnerControls"/>
+    <ds:schemaRef ds:uri="http://schemas.microsoft.com/sharepoint/v3/contenttype/forms"/>
   </ds:schemaRefs>
 </ds:datastoreItem>
 </file>
@@ -13184,9 +13671,17 @@
 </file>
 
 <file path=customXml/itemProps3.xml><?xml version="1.0" encoding="utf-8"?>
-<ds:datastoreItem xmlns:ds="http://schemas.openxmlformats.org/officeDocument/2006/customXml" ds:itemID="{56EA677F-09E4-40FC-B998-315C6F85D97B}">
+<ds:datastoreItem xmlns:ds="http://schemas.openxmlformats.org/officeDocument/2006/customXml" ds:itemID="{63A6CF10-4272-4792-86D6-C2A00A3F8DBF}">
   <ds:schemaRefs>
-    <ds:schemaRef ds:uri="http://schemas.microsoft.com/sharepoint/v3/contenttype/forms"/>
+    <ds:schemaRef ds:uri="http://schemas.microsoft.com/office/2006/metadata/contentType"/>
+    <ds:schemaRef ds:uri="http://schemas.microsoft.com/office/2006/metadata/properties/metaAttributes"/>
+    <ds:schemaRef ds:uri="http://www.w3.org/2001/XMLSchema"/>
+    <ds:schemaRef ds:uri="http://schemas.microsoft.com/office/2006/metadata/properties"/>
+    <ds:schemaRef ds:uri="http://schemas.openxmlformats.org/package/2006/metadata/core-properties"/>
+    <ds:schemaRef ds:uri="http://purl.org/dc/elements/1.1/"/>
+    <ds:schemaRef ds:uri="http://purl.org/dc/terms/"/>
+    <ds:schemaRef ds:uri="http://schemas.microsoft.com/internal/obd"/>
+    <ds:schemaRef ds:uri="http://schemas.microsoft.com/office/infopath/2007/PartnerControls"/>
   </ds:schemaRefs>
 </ds:datastoreItem>
 </file>
</xml_diff>

<commit_message>
updated ppt preso and added notrace to utils source
</commit_message>
<xml_diff>
--- a/doc/versionControl.pptx
+++ b/doc/versionControl.pptx
@@ -2021,6 +2021,13 @@
         </dgm:presLayoutVars>
       </dgm:prSet>
       <dgm:spPr/>
+      <dgm:t>
+        <a:bodyPr/>
+        <a:lstStyle/>
+        <a:p>
+          <a:endParaRPr lang="en-US"/>
+        </a:p>
+      </dgm:t>
     </dgm:pt>
     <dgm:pt modelId="{E0714F84-9967-4121-BCEC-81F104297DC6}" type="pres">
       <dgm:prSet presAssocID="{3BFC2D99-54F2-4F56-ABDC-4D2D1E5A4444}" presName="hierRoot1" presStyleCnt="0">
@@ -2041,10 +2048,24 @@
         </dgm:presLayoutVars>
       </dgm:prSet>
       <dgm:spPr/>
+      <dgm:t>
+        <a:bodyPr/>
+        <a:lstStyle/>
+        <a:p>
+          <a:endParaRPr lang="en-US"/>
+        </a:p>
+      </dgm:t>
     </dgm:pt>
     <dgm:pt modelId="{028CE1DB-957C-41E7-B9E1-6D9A42F8FB0E}" type="pres">
       <dgm:prSet presAssocID="{3BFC2D99-54F2-4F56-ABDC-4D2D1E5A4444}" presName="rootConnector1" presStyleLbl="node1" presStyleIdx="0" presStyleCnt="0"/>
       <dgm:spPr/>
+      <dgm:t>
+        <a:bodyPr/>
+        <a:lstStyle/>
+        <a:p>
+          <a:endParaRPr lang="en-US"/>
+        </a:p>
+      </dgm:t>
     </dgm:pt>
     <dgm:pt modelId="{5AD44D2D-4D05-461A-9D73-D8F2EDF0E371}" type="pres">
       <dgm:prSet presAssocID="{3BFC2D99-54F2-4F56-ABDC-4D2D1E5A4444}" presName="hierChild2" presStyleCnt="0"/>
@@ -2053,6 +2074,13 @@
     <dgm:pt modelId="{158B7BDB-81BA-421C-8439-08A0B5F689FE}" type="pres">
       <dgm:prSet presAssocID="{D30938AD-CB50-4663-9E84-6F16F0A37FB4}" presName="Name37" presStyleLbl="parChTrans1D2" presStyleIdx="0" presStyleCnt="8"/>
       <dgm:spPr/>
+      <dgm:t>
+        <a:bodyPr/>
+        <a:lstStyle/>
+        <a:p>
+          <a:endParaRPr lang="en-US"/>
+        </a:p>
+      </dgm:t>
     </dgm:pt>
     <dgm:pt modelId="{BF0736E9-E263-44A3-9B19-47190CFBA602}" type="pres">
       <dgm:prSet presAssocID="{6272F718-0281-4B8E-96CA-9336D1DC1410}" presName="hierRoot2" presStyleCnt="0">
@@ -2084,6 +2112,13 @@
     <dgm:pt modelId="{7385A498-D524-4331-903E-550C4195C356}" type="pres">
       <dgm:prSet presAssocID="{6272F718-0281-4B8E-96CA-9336D1DC1410}" presName="rootConnector" presStyleLbl="node2" presStyleIdx="0" presStyleCnt="8"/>
       <dgm:spPr/>
+      <dgm:t>
+        <a:bodyPr/>
+        <a:lstStyle/>
+        <a:p>
+          <a:endParaRPr lang="en-US"/>
+        </a:p>
+      </dgm:t>
     </dgm:pt>
     <dgm:pt modelId="{603BA146-A534-495B-8B54-FAD14995DD35}" type="pres">
       <dgm:prSet presAssocID="{6272F718-0281-4B8E-96CA-9336D1DC1410}" presName="hierChild4" presStyleCnt="0"/>
@@ -2096,6 +2131,13 @@
     <dgm:pt modelId="{D314536C-ACC2-4590-BE51-4E143107E4A8}" type="pres">
       <dgm:prSet presAssocID="{7CA3D873-A3F7-4257-991B-FB6E57BBECE6}" presName="Name37" presStyleLbl="parChTrans1D2" presStyleIdx="1" presStyleCnt="8"/>
       <dgm:spPr/>
+      <dgm:t>
+        <a:bodyPr/>
+        <a:lstStyle/>
+        <a:p>
+          <a:endParaRPr lang="en-US"/>
+        </a:p>
+      </dgm:t>
     </dgm:pt>
     <dgm:pt modelId="{35C8BEA7-D12A-4A5E-9292-56F043596D0F}" type="pres">
       <dgm:prSet presAssocID="{FE01D7D5-992C-48F5-94FC-98E66EC1519F}" presName="hierRoot2" presStyleCnt="0">
@@ -2127,6 +2169,13 @@
     <dgm:pt modelId="{7C4E71F4-A14B-4814-8EAE-3BFDAB039162}" type="pres">
       <dgm:prSet presAssocID="{FE01D7D5-992C-48F5-94FC-98E66EC1519F}" presName="rootConnector" presStyleLbl="node2" presStyleIdx="1" presStyleCnt="8"/>
       <dgm:spPr/>
+      <dgm:t>
+        <a:bodyPr/>
+        <a:lstStyle/>
+        <a:p>
+          <a:endParaRPr lang="en-US"/>
+        </a:p>
+      </dgm:t>
     </dgm:pt>
     <dgm:pt modelId="{74D5B64C-64F1-4C25-BDF7-0D4455003B9E}" type="pres">
       <dgm:prSet presAssocID="{FE01D7D5-992C-48F5-94FC-98E66EC1519F}" presName="hierChild4" presStyleCnt="0"/>
@@ -2139,6 +2188,13 @@
     <dgm:pt modelId="{5CF26A62-4DAE-4DF6-AC2D-AA50C348D246}" type="pres">
       <dgm:prSet presAssocID="{77A798D0-4E44-4FD7-BD4B-1E07C2A650E4}" presName="Name37" presStyleLbl="parChTrans1D2" presStyleIdx="2" presStyleCnt="8"/>
       <dgm:spPr/>
+      <dgm:t>
+        <a:bodyPr/>
+        <a:lstStyle/>
+        <a:p>
+          <a:endParaRPr lang="en-US"/>
+        </a:p>
+      </dgm:t>
     </dgm:pt>
     <dgm:pt modelId="{C706CEF6-25A6-464C-81EB-1A9D32839C73}" type="pres">
       <dgm:prSet presAssocID="{1827938A-4461-4C74-83D4-B8E5FE5790F0}" presName="hierRoot2" presStyleCnt="0">
@@ -2159,10 +2215,24 @@
         </dgm:presLayoutVars>
       </dgm:prSet>
       <dgm:spPr/>
+      <dgm:t>
+        <a:bodyPr/>
+        <a:lstStyle/>
+        <a:p>
+          <a:endParaRPr lang="en-US"/>
+        </a:p>
+      </dgm:t>
     </dgm:pt>
     <dgm:pt modelId="{ABBD46AD-BFA1-4A69-A78E-3C6498564907}" type="pres">
       <dgm:prSet presAssocID="{1827938A-4461-4C74-83D4-B8E5FE5790F0}" presName="rootConnector" presStyleLbl="node2" presStyleIdx="2" presStyleCnt="8"/>
       <dgm:spPr/>
+      <dgm:t>
+        <a:bodyPr/>
+        <a:lstStyle/>
+        <a:p>
+          <a:endParaRPr lang="en-US"/>
+        </a:p>
+      </dgm:t>
     </dgm:pt>
     <dgm:pt modelId="{4B67ABFD-B399-4B88-8CAB-D49359CE5A76}" type="pres">
       <dgm:prSet presAssocID="{1827938A-4461-4C74-83D4-B8E5FE5790F0}" presName="hierChild4" presStyleCnt="0"/>
@@ -2175,6 +2245,13 @@
     <dgm:pt modelId="{40C180D0-1B00-442F-8BA1-A2996109948C}" type="pres">
       <dgm:prSet presAssocID="{5678BD54-44B6-4A5A-8BCB-8972579DD724}" presName="Name37" presStyleLbl="parChTrans1D2" presStyleIdx="3" presStyleCnt="8"/>
       <dgm:spPr/>
+      <dgm:t>
+        <a:bodyPr/>
+        <a:lstStyle/>
+        <a:p>
+          <a:endParaRPr lang="en-US"/>
+        </a:p>
+      </dgm:t>
     </dgm:pt>
     <dgm:pt modelId="{D385AE9E-5A9B-45AC-A020-0510D5A9FE54}" type="pres">
       <dgm:prSet presAssocID="{9513878F-857A-47B3-93EC-DC613E0E9FCF}" presName="hierRoot2" presStyleCnt="0">
@@ -2206,6 +2283,13 @@
     <dgm:pt modelId="{B50E2733-0437-4C6E-BD17-21329A79757A}" type="pres">
       <dgm:prSet presAssocID="{9513878F-857A-47B3-93EC-DC613E0E9FCF}" presName="rootConnector" presStyleLbl="node2" presStyleIdx="3" presStyleCnt="8"/>
       <dgm:spPr/>
+      <dgm:t>
+        <a:bodyPr/>
+        <a:lstStyle/>
+        <a:p>
+          <a:endParaRPr lang="en-US"/>
+        </a:p>
+      </dgm:t>
     </dgm:pt>
     <dgm:pt modelId="{36543A45-72D6-4A05-B131-93F0543B5220}" type="pres">
       <dgm:prSet presAssocID="{9513878F-857A-47B3-93EC-DC613E0E9FCF}" presName="hierChild4" presStyleCnt="0"/>
@@ -2218,6 +2302,13 @@
     <dgm:pt modelId="{09C1E1B6-0086-4404-B701-5CD9335F3B16}" type="pres">
       <dgm:prSet presAssocID="{BDFA1744-A5B0-4A1F-8C25-CCF5E20A1147}" presName="Name37" presStyleLbl="parChTrans1D2" presStyleIdx="4" presStyleCnt="8"/>
       <dgm:spPr/>
+      <dgm:t>
+        <a:bodyPr/>
+        <a:lstStyle/>
+        <a:p>
+          <a:endParaRPr lang="en-US"/>
+        </a:p>
+      </dgm:t>
     </dgm:pt>
     <dgm:pt modelId="{EE569D92-5FB6-4D5F-898F-E3B930BC9FE3}" type="pres">
       <dgm:prSet presAssocID="{4B29B0E8-CA69-4FEF-9CC5-F439E6D86762}" presName="hierRoot2" presStyleCnt="0">
@@ -2238,10 +2329,24 @@
         </dgm:presLayoutVars>
       </dgm:prSet>
       <dgm:spPr/>
+      <dgm:t>
+        <a:bodyPr/>
+        <a:lstStyle/>
+        <a:p>
+          <a:endParaRPr lang="en-US"/>
+        </a:p>
+      </dgm:t>
     </dgm:pt>
     <dgm:pt modelId="{3149285B-610F-4810-A59A-580527F6F166}" type="pres">
       <dgm:prSet presAssocID="{4B29B0E8-CA69-4FEF-9CC5-F439E6D86762}" presName="rootConnector" presStyleLbl="node2" presStyleIdx="4" presStyleCnt="8"/>
       <dgm:spPr/>
+      <dgm:t>
+        <a:bodyPr/>
+        <a:lstStyle/>
+        <a:p>
+          <a:endParaRPr lang="en-US"/>
+        </a:p>
+      </dgm:t>
     </dgm:pt>
     <dgm:pt modelId="{86603D32-0B22-4E35-A2C8-4ED0BF4D0598}" type="pres">
       <dgm:prSet presAssocID="{4B29B0E8-CA69-4FEF-9CC5-F439E6D86762}" presName="hierChild4" presStyleCnt="0"/>
@@ -2254,6 +2359,13 @@
     <dgm:pt modelId="{F330C14F-5E51-45A3-8BBA-FD6B3CA8B4D5}" type="pres">
       <dgm:prSet presAssocID="{4B7A7F81-85AE-4C26-9391-DBA667A0C438}" presName="Name37" presStyleLbl="parChTrans1D2" presStyleIdx="5" presStyleCnt="8"/>
       <dgm:spPr/>
+      <dgm:t>
+        <a:bodyPr/>
+        <a:lstStyle/>
+        <a:p>
+          <a:endParaRPr lang="en-US"/>
+        </a:p>
+      </dgm:t>
     </dgm:pt>
     <dgm:pt modelId="{2FE4A458-1D21-47FB-B204-6F1428D51226}" type="pres">
       <dgm:prSet presAssocID="{DE9A6DA2-48E4-45CD-BDC3-2AC37AB54603}" presName="hierRoot2" presStyleCnt="0">
@@ -2274,10 +2386,24 @@
         </dgm:presLayoutVars>
       </dgm:prSet>
       <dgm:spPr/>
+      <dgm:t>
+        <a:bodyPr/>
+        <a:lstStyle/>
+        <a:p>
+          <a:endParaRPr lang="en-US"/>
+        </a:p>
+      </dgm:t>
     </dgm:pt>
     <dgm:pt modelId="{6DB1CD38-5A46-40A5-A321-A083EFD0A09A}" type="pres">
       <dgm:prSet presAssocID="{DE9A6DA2-48E4-45CD-BDC3-2AC37AB54603}" presName="rootConnector" presStyleLbl="node2" presStyleIdx="5" presStyleCnt="8"/>
       <dgm:spPr/>
+      <dgm:t>
+        <a:bodyPr/>
+        <a:lstStyle/>
+        <a:p>
+          <a:endParaRPr lang="en-US"/>
+        </a:p>
+      </dgm:t>
     </dgm:pt>
     <dgm:pt modelId="{35D1AF46-BD2E-4D47-BF3F-9EBEC13C6D21}" type="pres">
       <dgm:prSet presAssocID="{DE9A6DA2-48E4-45CD-BDC3-2AC37AB54603}" presName="hierChild4" presStyleCnt="0"/>
@@ -2290,6 +2416,13 @@
     <dgm:pt modelId="{2F72FC64-6020-484E-A27C-11BC33001E45}" type="pres">
       <dgm:prSet presAssocID="{34BD77E1-5A4B-4BC3-9D05-64D928343E3C}" presName="Name37" presStyleLbl="parChTrans1D2" presStyleIdx="6" presStyleCnt="8"/>
       <dgm:spPr/>
+      <dgm:t>
+        <a:bodyPr/>
+        <a:lstStyle/>
+        <a:p>
+          <a:endParaRPr lang="en-US"/>
+        </a:p>
+      </dgm:t>
     </dgm:pt>
     <dgm:pt modelId="{D00FB8F9-D88D-4CAD-B100-AFCAFD61C1F1}" type="pres">
       <dgm:prSet presAssocID="{D2497981-03D9-4665-92EB-9542207EE5A0}" presName="hierRoot2" presStyleCnt="0">
@@ -2310,10 +2443,24 @@
         </dgm:presLayoutVars>
       </dgm:prSet>
       <dgm:spPr/>
+      <dgm:t>
+        <a:bodyPr/>
+        <a:lstStyle/>
+        <a:p>
+          <a:endParaRPr lang="en-US"/>
+        </a:p>
+      </dgm:t>
     </dgm:pt>
     <dgm:pt modelId="{F1B092C9-6C05-4366-9E77-097203F742F5}" type="pres">
       <dgm:prSet presAssocID="{D2497981-03D9-4665-92EB-9542207EE5A0}" presName="rootConnector" presStyleLbl="node2" presStyleIdx="6" presStyleCnt="8"/>
       <dgm:spPr/>
+      <dgm:t>
+        <a:bodyPr/>
+        <a:lstStyle/>
+        <a:p>
+          <a:endParaRPr lang="en-US"/>
+        </a:p>
+      </dgm:t>
     </dgm:pt>
     <dgm:pt modelId="{2A6937BF-DABA-422F-AEBB-C9414D19D3D8}" type="pres">
       <dgm:prSet presAssocID="{D2497981-03D9-4665-92EB-9542207EE5A0}" presName="hierChild4" presStyleCnt="0"/>
@@ -2326,6 +2473,13 @@
     <dgm:pt modelId="{2935292A-D4D0-48F8-812D-C13E18495739}" type="pres">
       <dgm:prSet presAssocID="{0ECAC1D1-5B85-45A5-91F8-C84078419220}" presName="Name37" presStyleLbl="parChTrans1D2" presStyleIdx="7" presStyleCnt="8"/>
       <dgm:spPr/>
+      <dgm:t>
+        <a:bodyPr/>
+        <a:lstStyle/>
+        <a:p>
+          <a:endParaRPr lang="en-US"/>
+        </a:p>
+      </dgm:t>
     </dgm:pt>
     <dgm:pt modelId="{0117CEF3-B35B-4544-BAB2-CA7CF3B5ED61}" type="pres">
       <dgm:prSet presAssocID="{B1890DBD-9269-4E39-A5D8-D46B74618176}" presName="hierRoot2" presStyleCnt="0">
@@ -2346,10 +2500,24 @@
         </dgm:presLayoutVars>
       </dgm:prSet>
       <dgm:spPr/>
+      <dgm:t>
+        <a:bodyPr/>
+        <a:lstStyle/>
+        <a:p>
+          <a:endParaRPr lang="en-US"/>
+        </a:p>
+      </dgm:t>
     </dgm:pt>
     <dgm:pt modelId="{719E8FA9-5EE4-4E9F-83A1-D76E75B8FD51}" type="pres">
       <dgm:prSet presAssocID="{B1890DBD-9269-4E39-A5D8-D46B74618176}" presName="rootConnector" presStyleLbl="node2" presStyleIdx="7" presStyleCnt="8"/>
       <dgm:spPr/>
+      <dgm:t>
+        <a:bodyPr/>
+        <a:lstStyle/>
+        <a:p>
+          <a:endParaRPr lang="en-US"/>
+        </a:p>
+      </dgm:t>
     </dgm:pt>
     <dgm:pt modelId="{DB8F3D63-C2C8-438E-B954-ABFADCF68BA1}" type="pres">
       <dgm:prSet presAssocID="{B1890DBD-9269-4E39-A5D8-D46B74618176}" presName="hierChild4" presStyleCnt="0"/>
@@ -2365,42 +2533,42 @@
     </dgm:pt>
   </dgm:ptLst>
   <dgm:cxnLst>
+    <dgm:cxn modelId="{D777201F-DA12-4FE8-9270-616A7B60F12D}" srcId="{3BFC2D99-54F2-4F56-ABDC-4D2D1E5A4444}" destId="{FE01D7D5-992C-48F5-94FC-98E66EC1519F}" srcOrd="1" destOrd="0" parTransId="{7CA3D873-A3F7-4257-991B-FB6E57BBECE6}" sibTransId="{0777F037-AA3A-4411-9288-81971C482D39}"/>
+    <dgm:cxn modelId="{63F6AEA9-6B01-4371-83E3-DDB5A3D19F28}" type="presOf" srcId="{FE01D7D5-992C-48F5-94FC-98E66EC1519F}" destId="{FE129309-50B7-46C3-8306-87B07F2F963E}" srcOrd="0" destOrd="0" presId="urn:microsoft.com/office/officeart/2005/8/layout/orgChart1"/>
+    <dgm:cxn modelId="{242DAF77-656B-469B-97F7-08463C59BA9A}" type="presOf" srcId="{3BFC2D99-54F2-4F56-ABDC-4D2D1E5A4444}" destId="{028CE1DB-957C-41E7-B9E1-6D9A42F8FB0E}" srcOrd="1" destOrd="0" presId="urn:microsoft.com/office/officeart/2005/8/layout/orgChart1"/>
+    <dgm:cxn modelId="{6B930E62-5735-463A-BB60-6AB3DE7FA6A0}" type="presOf" srcId="{4B29B0E8-CA69-4FEF-9CC5-F439E6D86762}" destId="{3149285B-610F-4810-A59A-580527F6F166}" srcOrd="1" destOrd="0" presId="urn:microsoft.com/office/officeart/2005/8/layout/orgChart1"/>
+    <dgm:cxn modelId="{00D0AF6C-BF0D-414C-94AE-2C657106249D}" type="presOf" srcId="{D2497981-03D9-4665-92EB-9542207EE5A0}" destId="{F1B092C9-6C05-4366-9E77-097203F742F5}" srcOrd="1" destOrd="0" presId="urn:microsoft.com/office/officeart/2005/8/layout/orgChart1"/>
+    <dgm:cxn modelId="{FAAE448F-B6A3-435E-813B-AF9639248698}" srcId="{3BFC2D99-54F2-4F56-ABDC-4D2D1E5A4444}" destId="{9513878F-857A-47B3-93EC-DC613E0E9FCF}" srcOrd="3" destOrd="0" parTransId="{5678BD54-44B6-4A5A-8BCB-8972579DD724}" sibTransId="{02A9338B-0022-4C50-880B-76EE9F45B942}"/>
+    <dgm:cxn modelId="{F20152F7-AD74-4FF4-A560-53102DC24FE7}" srcId="{3BFC2D99-54F2-4F56-ABDC-4D2D1E5A4444}" destId="{DE9A6DA2-48E4-45CD-BDC3-2AC37AB54603}" srcOrd="5" destOrd="0" parTransId="{4B7A7F81-85AE-4C26-9391-DBA667A0C438}" sibTransId="{ED2CFA24-9B66-4289-912A-0BEDB12C8AF1}"/>
+    <dgm:cxn modelId="{41B7EDF7-CCB4-415C-9108-FC1992CB2A40}" type="presOf" srcId="{7CA3D873-A3F7-4257-991B-FB6E57BBECE6}" destId="{D314536C-ACC2-4590-BE51-4E143107E4A8}" srcOrd="0" destOrd="0" presId="urn:microsoft.com/office/officeart/2005/8/layout/orgChart1"/>
+    <dgm:cxn modelId="{8150823D-6615-4E5E-B2DB-042C8B097E69}" type="presOf" srcId="{DE9A6DA2-48E4-45CD-BDC3-2AC37AB54603}" destId="{6DB1CD38-5A46-40A5-A321-A083EFD0A09A}" srcOrd="1" destOrd="0" presId="urn:microsoft.com/office/officeart/2005/8/layout/orgChart1"/>
+    <dgm:cxn modelId="{AAB9FDE5-E752-464B-A09D-664C120C9132}" srcId="{574DF99C-4176-499A-B61F-775D3A99A96C}" destId="{3BFC2D99-54F2-4F56-ABDC-4D2D1E5A4444}" srcOrd="0" destOrd="0" parTransId="{A8AD49DD-D239-4CA8-88D0-271653106B2D}" sibTransId="{B9E47118-F99A-4F45-996D-372EC8F72170}"/>
+    <dgm:cxn modelId="{924C0B64-E50E-4868-9CD4-3B2432C7FF88}" type="presOf" srcId="{77A798D0-4E44-4FD7-BD4B-1E07C2A650E4}" destId="{5CF26A62-4DAE-4DF6-AC2D-AA50C348D246}" srcOrd="0" destOrd="0" presId="urn:microsoft.com/office/officeart/2005/8/layout/orgChart1"/>
+    <dgm:cxn modelId="{2AB28060-6B46-4447-9DED-0430D902C049}" type="presOf" srcId="{1827938A-4461-4C74-83D4-B8E5FE5790F0}" destId="{ABBD46AD-BFA1-4A69-A78E-3C6498564907}" srcOrd="1" destOrd="0" presId="urn:microsoft.com/office/officeart/2005/8/layout/orgChart1"/>
+    <dgm:cxn modelId="{4ADCA160-32C6-4548-927D-07F1CA0DDE57}" type="presOf" srcId="{1827938A-4461-4C74-83D4-B8E5FE5790F0}" destId="{0A9458DE-CEF8-4FA3-98D0-60929B6EE9C8}" srcOrd="0" destOrd="0" presId="urn:microsoft.com/office/officeart/2005/8/layout/orgChart1"/>
+    <dgm:cxn modelId="{6F20E24C-B22E-45C1-8BD2-10025C50F363}" type="presOf" srcId="{0ECAC1D1-5B85-45A5-91F8-C84078419220}" destId="{2935292A-D4D0-48F8-812D-C13E18495739}" srcOrd="0" destOrd="0" presId="urn:microsoft.com/office/officeart/2005/8/layout/orgChart1"/>
+    <dgm:cxn modelId="{31FDCAE1-C80B-496F-9053-7EECFB5CF6CB}" srcId="{3BFC2D99-54F2-4F56-ABDC-4D2D1E5A4444}" destId="{B1890DBD-9269-4E39-A5D8-D46B74618176}" srcOrd="7" destOrd="0" parTransId="{0ECAC1D1-5B85-45A5-91F8-C84078419220}" sibTransId="{7A44B534-D55B-4604-9962-304129CFF442}"/>
+    <dgm:cxn modelId="{BC430273-C0D1-4048-ADBB-5001ED6B240F}" type="presOf" srcId="{9513878F-857A-47B3-93EC-DC613E0E9FCF}" destId="{943019AC-F290-4309-8BBB-DD8C32D2005A}" srcOrd="0" destOrd="0" presId="urn:microsoft.com/office/officeart/2005/8/layout/orgChart1"/>
+    <dgm:cxn modelId="{2421CD53-9FF3-4FA7-9CEA-8E3A9714392A}" type="presOf" srcId="{3BFC2D99-54F2-4F56-ABDC-4D2D1E5A4444}" destId="{371D36C4-2300-450B-9352-555F87D138B9}" srcOrd="0" destOrd="0" presId="urn:microsoft.com/office/officeart/2005/8/layout/orgChart1"/>
+    <dgm:cxn modelId="{D1526B44-3440-42B1-BEB7-FBFEEF2A7C0E}" type="presOf" srcId="{4B7A7F81-85AE-4C26-9391-DBA667A0C438}" destId="{F330C14F-5E51-45A3-8BBA-FD6B3CA8B4D5}" srcOrd="0" destOrd="0" presId="urn:microsoft.com/office/officeart/2005/8/layout/orgChart1"/>
+    <dgm:cxn modelId="{765CD9D2-4EB9-46B7-B890-61A36525C9F9}" type="presOf" srcId="{6272F718-0281-4B8E-96CA-9336D1DC1410}" destId="{92E7D021-B009-4371-BFE2-14E1AD2DC69F}" srcOrd="0" destOrd="0" presId="urn:microsoft.com/office/officeart/2005/8/layout/orgChart1"/>
+    <dgm:cxn modelId="{3122EEEB-4127-4DCB-9752-0B9405C20019}" srcId="{3BFC2D99-54F2-4F56-ABDC-4D2D1E5A4444}" destId="{6272F718-0281-4B8E-96CA-9336D1DC1410}" srcOrd="0" destOrd="0" parTransId="{D30938AD-CB50-4663-9E84-6F16F0A37FB4}" sibTransId="{9627C3FB-94F7-4A67-9DFC-3FCDA0F271C4}"/>
+    <dgm:cxn modelId="{EE611BF4-851B-4C6A-B020-3F9DC6F01811}" type="presOf" srcId="{4B29B0E8-CA69-4FEF-9CC5-F439E6D86762}" destId="{B2626B9F-2EF4-4FE5-9E4C-A8129BA31E89}" srcOrd="0" destOrd="0" presId="urn:microsoft.com/office/officeart/2005/8/layout/orgChart1"/>
+    <dgm:cxn modelId="{E837564D-5E93-43E9-B7A9-D742269CE192}" type="presOf" srcId="{9513878F-857A-47B3-93EC-DC613E0E9FCF}" destId="{B50E2733-0437-4C6E-BD17-21329A79757A}" srcOrd="1" destOrd="0" presId="urn:microsoft.com/office/officeart/2005/8/layout/orgChart1"/>
+    <dgm:cxn modelId="{CAA1C141-0296-4315-94B2-8A60F2A930B4}" type="presOf" srcId="{B1890DBD-9269-4E39-A5D8-D46B74618176}" destId="{719E8FA9-5EE4-4E9F-83A1-D76E75B8FD51}" srcOrd="1" destOrd="0" presId="urn:microsoft.com/office/officeart/2005/8/layout/orgChart1"/>
+    <dgm:cxn modelId="{85E440B9-DA07-4465-AE76-52DD0C3A99C1}" srcId="{3BFC2D99-54F2-4F56-ABDC-4D2D1E5A4444}" destId="{4B29B0E8-CA69-4FEF-9CC5-F439E6D86762}" srcOrd="4" destOrd="0" parTransId="{BDFA1744-A5B0-4A1F-8C25-CCF5E20A1147}" sibTransId="{34FFBDAF-B3C2-4AC7-8C57-86DB83683980}"/>
+    <dgm:cxn modelId="{B6688152-F2CE-45BB-AC0E-4C2D4BC8C672}" type="presOf" srcId="{6272F718-0281-4B8E-96CA-9336D1DC1410}" destId="{7385A498-D524-4331-903E-550C4195C356}" srcOrd="1" destOrd="0" presId="urn:microsoft.com/office/officeart/2005/8/layout/orgChart1"/>
+    <dgm:cxn modelId="{8CFE64AF-4845-40BB-8B76-DE7B76267885}" type="presOf" srcId="{5678BD54-44B6-4A5A-8BCB-8972579DD724}" destId="{40C180D0-1B00-442F-8BA1-A2996109948C}" srcOrd="0" destOrd="0" presId="urn:microsoft.com/office/officeart/2005/8/layout/orgChart1"/>
+    <dgm:cxn modelId="{D8273A52-B759-460B-A936-1989D97F472D}" type="presOf" srcId="{D30938AD-CB50-4663-9E84-6F16F0A37FB4}" destId="{158B7BDB-81BA-421C-8439-08A0B5F689FE}" srcOrd="0" destOrd="0" presId="urn:microsoft.com/office/officeart/2005/8/layout/orgChart1"/>
     <dgm:cxn modelId="{23D12B47-C6DE-4B25-A071-1DEE3AD876D3}" type="presOf" srcId="{BDFA1744-A5B0-4A1F-8C25-CCF5E20A1147}" destId="{09C1E1B6-0086-4404-B701-5CD9335F3B16}" srcOrd="0" destOrd="0" presId="urn:microsoft.com/office/officeart/2005/8/layout/orgChart1"/>
-    <dgm:cxn modelId="{FAAE448F-B6A3-435E-813B-AF9639248698}" srcId="{3BFC2D99-54F2-4F56-ABDC-4D2D1E5A4444}" destId="{9513878F-857A-47B3-93EC-DC613E0E9FCF}" srcOrd="3" destOrd="0" parTransId="{5678BD54-44B6-4A5A-8BCB-8972579DD724}" sibTransId="{02A9338B-0022-4C50-880B-76EE9F45B942}"/>
-    <dgm:cxn modelId="{31FDCAE1-C80B-496F-9053-7EECFB5CF6CB}" srcId="{3BFC2D99-54F2-4F56-ABDC-4D2D1E5A4444}" destId="{B1890DBD-9269-4E39-A5D8-D46B74618176}" srcOrd="7" destOrd="0" parTransId="{0ECAC1D1-5B85-45A5-91F8-C84078419220}" sibTransId="{7A44B534-D55B-4604-9962-304129CFF442}"/>
-    <dgm:cxn modelId="{242DAF77-656B-469B-97F7-08463C59BA9A}" type="presOf" srcId="{3BFC2D99-54F2-4F56-ABDC-4D2D1E5A4444}" destId="{028CE1DB-957C-41E7-B9E1-6D9A42F8FB0E}" srcOrd="1" destOrd="0" presId="urn:microsoft.com/office/officeart/2005/8/layout/orgChart1"/>
-    <dgm:cxn modelId="{AAB9FDE5-E752-464B-A09D-664C120C9132}" srcId="{574DF99C-4176-499A-B61F-775D3A99A96C}" destId="{3BFC2D99-54F2-4F56-ABDC-4D2D1E5A4444}" srcOrd="0" destOrd="0" parTransId="{A8AD49DD-D239-4CA8-88D0-271653106B2D}" sibTransId="{B9E47118-F99A-4F45-996D-372EC8F72170}"/>
-    <dgm:cxn modelId="{14712D3B-CD33-4164-A657-5E7C66CAE92A}" type="presOf" srcId="{D2497981-03D9-4665-92EB-9542207EE5A0}" destId="{4BE55D9B-F2BE-40E0-988E-BDE8EB2B357A}" srcOrd="0" destOrd="0" presId="urn:microsoft.com/office/officeart/2005/8/layout/orgChart1"/>
-    <dgm:cxn modelId="{EE611BF4-851B-4C6A-B020-3F9DC6F01811}" type="presOf" srcId="{4B29B0E8-CA69-4FEF-9CC5-F439E6D86762}" destId="{B2626B9F-2EF4-4FE5-9E4C-A8129BA31E89}" srcOrd="0" destOrd="0" presId="urn:microsoft.com/office/officeart/2005/8/layout/orgChart1"/>
-    <dgm:cxn modelId="{6F20E24C-B22E-45C1-8BD2-10025C50F363}" type="presOf" srcId="{0ECAC1D1-5B85-45A5-91F8-C84078419220}" destId="{2935292A-D4D0-48F8-812D-C13E18495739}" srcOrd="0" destOrd="0" presId="urn:microsoft.com/office/officeart/2005/8/layout/orgChart1"/>
-    <dgm:cxn modelId="{8CFE64AF-4845-40BB-8B76-DE7B76267885}" type="presOf" srcId="{5678BD54-44B6-4A5A-8BCB-8972579DD724}" destId="{40C180D0-1B00-442F-8BA1-A2996109948C}" srcOrd="0" destOrd="0" presId="urn:microsoft.com/office/officeart/2005/8/layout/orgChart1"/>
-    <dgm:cxn modelId="{00D0AF6C-BF0D-414C-94AE-2C657106249D}" type="presOf" srcId="{D2497981-03D9-4665-92EB-9542207EE5A0}" destId="{F1B092C9-6C05-4366-9E77-097203F742F5}" srcOrd="1" destOrd="0" presId="urn:microsoft.com/office/officeart/2005/8/layout/orgChart1"/>
-    <dgm:cxn modelId="{E837564D-5E93-43E9-B7A9-D742269CE192}" type="presOf" srcId="{9513878F-857A-47B3-93EC-DC613E0E9FCF}" destId="{B50E2733-0437-4C6E-BD17-21329A79757A}" srcOrd="1" destOrd="0" presId="urn:microsoft.com/office/officeart/2005/8/layout/orgChart1"/>
-    <dgm:cxn modelId="{F20152F7-AD74-4FF4-A560-53102DC24FE7}" srcId="{3BFC2D99-54F2-4F56-ABDC-4D2D1E5A4444}" destId="{DE9A6DA2-48E4-45CD-BDC3-2AC37AB54603}" srcOrd="5" destOrd="0" parTransId="{4B7A7F81-85AE-4C26-9391-DBA667A0C438}" sibTransId="{ED2CFA24-9B66-4289-912A-0BEDB12C8AF1}"/>
-    <dgm:cxn modelId="{2AB28060-6B46-4447-9DED-0430D902C049}" type="presOf" srcId="{1827938A-4461-4C74-83D4-B8E5FE5790F0}" destId="{ABBD46AD-BFA1-4A69-A78E-3C6498564907}" srcOrd="1" destOrd="0" presId="urn:microsoft.com/office/officeart/2005/8/layout/orgChart1"/>
-    <dgm:cxn modelId="{2421CD53-9FF3-4FA7-9CEA-8E3A9714392A}" type="presOf" srcId="{3BFC2D99-54F2-4F56-ABDC-4D2D1E5A4444}" destId="{371D36C4-2300-450B-9352-555F87D138B9}" srcOrd="0" destOrd="0" presId="urn:microsoft.com/office/officeart/2005/8/layout/orgChart1"/>
-    <dgm:cxn modelId="{BC430273-C0D1-4048-ADBB-5001ED6B240F}" type="presOf" srcId="{9513878F-857A-47B3-93EC-DC613E0E9FCF}" destId="{943019AC-F290-4309-8BBB-DD8C32D2005A}" srcOrd="0" destOrd="0" presId="urn:microsoft.com/office/officeart/2005/8/layout/orgChart1"/>
-    <dgm:cxn modelId="{D777201F-DA12-4FE8-9270-616A7B60F12D}" srcId="{3BFC2D99-54F2-4F56-ABDC-4D2D1E5A4444}" destId="{FE01D7D5-992C-48F5-94FC-98E66EC1519F}" srcOrd="1" destOrd="0" parTransId="{7CA3D873-A3F7-4257-991B-FB6E57BBECE6}" sibTransId="{0777F037-AA3A-4411-9288-81971C482D39}"/>
-    <dgm:cxn modelId="{6B930E62-5735-463A-BB60-6AB3DE7FA6A0}" type="presOf" srcId="{4B29B0E8-CA69-4FEF-9CC5-F439E6D86762}" destId="{3149285B-610F-4810-A59A-580527F6F166}" srcOrd="1" destOrd="0" presId="urn:microsoft.com/office/officeart/2005/8/layout/orgChart1"/>
-    <dgm:cxn modelId="{777C82DB-416B-4194-9B62-EE83F167CBC4}" srcId="{3BFC2D99-54F2-4F56-ABDC-4D2D1E5A4444}" destId="{D2497981-03D9-4665-92EB-9542207EE5A0}" srcOrd="6" destOrd="0" parTransId="{34BD77E1-5A4B-4BC3-9D05-64D928343E3C}" sibTransId="{14498747-DA1E-4409-90D0-BF8A48A3483B}"/>
-    <dgm:cxn modelId="{AF3FD5F8-0A77-45F2-9FAA-F75C6E59BACA}" type="presOf" srcId="{574DF99C-4176-499A-B61F-775D3A99A96C}" destId="{DAD55322-597F-4ED1-9260-8B14AA1999AE}" srcOrd="0" destOrd="0" presId="urn:microsoft.com/office/officeart/2005/8/layout/orgChart1"/>
-    <dgm:cxn modelId="{41B7EDF7-CCB4-415C-9108-FC1992CB2A40}" type="presOf" srcId="{7CA3D873-A3F7-4257-991B-FB6E57BBECE6}" destId="{D314536C-ACC2-4590-BE51-4E143107E4A8}" srcOrd="0" destOrd="0" presId="urn:microsoft.com/office/officeart/2005/8/layout/orgChart1"/>
-    <dgm:cxn modelId="{D1526B44-3440-42B1-BEB7-FBFEEF2A7C0E}" type="presOf" srcId="{4B7A7F81-85AE-4C26-9391-DBA667A0C438}" destId="{F330C14F-5E51-45A3-8BBA-FD6B3CA8B4D5}" srcOrd="0" destOrd="0" presId="urn:microsoft.com/office/officeart/2005/8/layout/orgChart1"/>
-    <dgm:cxn modelId="{3122EEEB-4127-4DCB-9752-0B9405C20019}" srcId="{3BFC2D99-54F2-4F56-ABDC-4D2D1E5A4444}" destId="{6272F718-0281-4B8E-96CA-9336D1DC1410}" srcOrd="0" destOrd="0" parTransId="{D30938AD-CB50-4663-9E84-6F16F0A37FB4}" sibTransId="{9627C3FB-94F7-4A67-9DFC-3FCDA0F271C4}"/>
-    <dgm:cxn modelId="{FE715640-4328-40A0-9071-DAD76E19762E}" type="presOf" srcId="{B1890DBD-9269-4E39-A5D8-D46B74618176}" destId="{7336B81B-55F5-4E76-89A4-BBBEAB58EA72}" srcOrd="0" destOrd="0" presId="urn:microsoft.com/office/officeart/2005/8/layout/orgChart1"/>
+    <dgm:cxn modelId="{FB9EC988-4CC4-4791-9393-435FC311B79F}" type="presOf" srcId="{DE9A6DA2-48E4-45CD-BDC3-2AC37AB54603}" destId="{99D6D0B4-FDC2-45F6-BF79-D664AA31EB5C}" srcOrd="0" destOrd="0" presId="urn:microsoft.com/office/officeart/2005/8/layout/orgChart1"/>
     <dgm:cxn modelId="{BA4EDF0C-887A-4EB2-B42D-204F34A6C296}" type="presOf" srcId="{34BD77E1-5A4B-4BC3-9D05-64D928343E3C}" destId="{2F72FC64-6020-484E-A27C-11BC33001E45}" srcOrd="0" destOrd="0" presId="urn:microsoft.com/office/officeart/2005/8/layout/orgChart1"/>
-    <dgm:cxn modelId="{D8273A52-B759-460B-A936-1989D97F472D}" type="presOf" srcId="{D30938AD-CB50-4663-9E84-6F16F0A37FB4}" destId="{158B7BDB-81BA-421C-8439-08A0B5F689FE}" srcOrd="0" destOrd="0" presId="urn:microsoft.com/office/officeart/2005/8/layout/orgChart1"/>
-    <dgm:cxn modelId="{4ADCA160-32C6-4548-927D-07F1CA0DDE57}" type="presOf" srcId="{1827938A-4461-4C74-83D4-B8E5FE5790F0}" destId="{0A9458DE-CEF8-4FA3-98D0-60929B6EE9C8}" srcOrd="0" destOrd="0" presId="urn:microsoft.com/office/officeart/2005/8/layout/orgChart1"/>
-    <dgm:cxn modelId="{8150823D-6615-4E5E-B2DB-042C8B097E69}" type="presOf" srcId="{DE9A6DA2-48E4-45CD-BDC3-2AC37AB54603}" destId="{6DB1CD38-5A46-40A5-A321-A083EFD0A09A}" srcOrd="1" destOrd="0" presId="urn:microsoft.com/office/officeart/2005/8/layout/orgChart1"/>
-    <dgm:cxn modelId="{924C0B64-E50E-4868-9CD4-3B2432C7FF88}" type="presOf" srcId="{77A798D0-4E44-4FD7-BD4B-1E07C2A650E4}" destId="{5CF26A62-4DAE-4DF6-AC2D-AA50C348D246}" srcOrd="0" destOrd="0" presId="urn:microsoft.com/office/officeart/2005/8/layout/orgChart1"/>
-    <dgm:cxn modelId="{CAA1C141-0296-4315-94B2-8A60F2A930B4}" type="presOf" srcId="{B1890DBD-9269-4E39-A5D8-D46B74618176}" destId="{719E8FA9-5EE4-4E9F-83A1-D76E75B8FD51}" srcOrd="1" destOrd="0" presId="urn:microsoft.com/office/officeart/2005/8/layout/orgChart1"/>
-    <dgm:cxn modelId="{FB9EC988-4CC4-4791-9393-435FC311B79F}" type="presOf" srcId="{DE9A6DA2-48E4-45CD-BDC3-2AC37AB54603}" destId="{99D6D0B4-FDC2-45F6-BF79-D664AA31EB5C}" srcOrd="0" destOrd="0" presId="urn:microsoft.com/office/officeart/2005/8/layout/orgChart1"/>
-    <dgm:cxn modelId="{85E440B9-DA07-4465-AE76-52DD0C3A99C1}" srcId="{3BFC2D99-54F2-4F56-ABDC-4D2D1E5A4444}" destId="{4B29B0E8-CA69-4FEF-9CC5-F439E6D86762}" srcOrd="4" destOrd="0" parTransId="{BDFA1744-A5B0-4A1F-8C25-CCF5E20A1147}" sibTransId="{34FFBDAF-B3C2-4AC7-8C57-86DB83683980}"/>
-    <dgm:cxn modelId="{765CD9D2-4EB9-46B7-B890-61A36525C9F9}" type="presOf" srcId="{6272F718-0281-4B8E-96CA-9336D1DC1410}" destId="{92E7D021-B009-4371-BFE2-14E1AD2DC69F}" srcOrd="0" destOrd="0" presId="urn:microsoft.com/office/officeart/2005/8/layout/orgChart1"/>
-    <dgm:cxn modelId="{B6688152-F2CE-45BB-AC0E-4C2D4BC8C672}" type="presOf" srcId="{6272F718-0281-4B8E-96CA-9336D1DC1410}" destId="{7385A498-D524-4331-903E-550C4195C356}" srcOrd="1" destOrd="0" presId="urn:microsoft.com/office/officeart/2005/8/layout/orgChart1"/>
     <dgm:cxn modelId="{24F0A3BF-EA9E-4B01-9BF7-819D99DC2587}" type="presOf" srcId="{FE01D7D5-992C-48F5-94FC-98E66EC1519F}" destId="{7C4E71F4-A14B-4814-8EAE-3BFDAB039162}" srcOrd="1" destOrd="0" presId="urn:microsoft.com/office/officeart/2005/8/layout/orgChart1"/>
     <dgm:cxn modelId="{0DA503EE-CD77-416C-93D1-47348DAAAB99}" srcId="{3BFC2D99-54F2-4F56-ABDC-4D2D1E5A4444}" destId="{1827938A-4461-4C74-83D4-B8E5FE5790F0}" srcOrd="2" destOrd="0" parTransId="{77A798D0-4E44-4FD7-BD4B-1E07C2A650E4}" sibTransId="{664A33D9-6050-4D44-93A4-FF169249954C}"/>
-    <dgm:cxn modelId="{63F6AEA9-6B01-4371-83E3-DDB5A3D19F28}" type="presOf" srcId="{FE01D7D5-992C-48F5-94FC-98E66EC1519F}" destId="{FE129309-50B7-46C3-8306-87B07F2F963E}" srcOrd="0" destOrd="0" presId="urn:microsoft.com/office/officeart/2005/8/layout/orgChart1"/>
+    <dgm:cxn modelId="{AF3FD5F8-0A77-45F2-9FAA-F75C6E59BACA}" type="presOf" srcId="{574DF99C-4176-499A-B61F-775D3A99A96C}" destId="{DAD55322-597F-4ED1-9260-8B14AA1999AE}" srcOrd="0" destOrd="0" presId="urn:microsoft.com/office/officeart/2005/8/layout/orgChart1"/>
+    <dgm:cxn modelId="{FE715640-4328-40A0-9071-DAD76E19762E}" type="presOf" srcId="{B1890DBD-9269-4E39-A5D8-D46B74618176}" destId="{7336B81B-55F5-4E76-89A4-BBBEAB58EA72}" srcOrd="0" destOrd="0" presId="urn:microsoft.com/office/officeart/2005/8/layout/orgChart1"/>
+    <dgm:cxn modelId="{777C82DB-416B-4194-9B62-EE83F167CBC4}" srcId="{3BFC2D99-54F2-4F56-ABDC-4D2D1E5A4444}" destId="{D2497981-03D9-4665-92EB-9542207EE5A0}" srcOrd="6" destOrd="0" parTransId="{34BD77E1-5A4B-4BC3-9D05-64D928343E3C}" sibTransId="{14498747-DA1E-4409-90D0-BF8A48A3483B}"/>
+    <dgm:cxn modelId="{14712D3B-CD33-4164-A657-5E7C66CAE92A}" type="presOf" srcId="{D2497981-03D9-4665-92EB-9542207EE5A0}" destId="{4BE55D9B-F2BE-40E0-988E-BDE8EB2B357A}" srcOrd="0" destOrd="0" presId="urn:microsoft.com/office/officeart/2005/8/layout/orgChart1"/>
     <dgm:cxn modelId="{5FFAB48C-E36F-4F04-9E0B-44EC61B8E6B6}" type="presParOf" srcId="{DAD55322-597F-4ED1-9260-8B14AA1999AE}" destId="{E0714F84-9967-4121-BCEC-81F104297DC6}" srcOrd="0" destOrd="0" presId="urn:microsoft.com/office/officeart/2005/8/layout/orgChart1"/>
     <dgm:cxn modelId="{4EC2CCCB-BF58-4F51-BA75-5AFA4DB25ADA}" type="presParOf" srcId="{E0714F84-9967-4121-BCEC-81F104297DC6}" destId="{30F32C6A-6D24-4DAD-9562-6DE784464E67}" srcOrd="0" destOrd="0" presId="urn:microsoft.com/office/officeart/2005/8/layout/orgChart1"/>
     <dgm:cxn modelId="{E3C16E2E-E2F3-47C0-9F1D-4835B0CB811C}" type="presParOf" srcId="{30F32C6A-6D24-4DAD-9562-6DE784464E67}" destId="{371D36C4-2300-450B-9352-555F87D138B9}" srcOrd="0" destOrd="0" presId="urn:microsoft.com/office/officeart/2005/8/layout/orgChart1"/>
@@ -8631,7 +8799,7 @@
             <a:fld id="{2EABF25A-48F1-429C-8CD7-3D994DBD22B5}" type="datetimeFigureOut">
               <a:rPr lang="en-US" smtClean="0"/>
               <a:pPr/>
-              <a:t>8/11/2014</a:t>
+              <a:t>2/11/2015</a:t>
             </a:fld>
             <a:endParaRPr lang="en-US" dirty="0"/>
           </a:p>
@@ -11788,23 +11956,7 @@
                 <a:ea typeface="+mj-ea"/>
                 <a:cs typeface="Calibri" pitchFamily="34" charset="0"/>
               </a:rPr>
-              <a:t>Revi</a:t>
-            </a:r>
-            <a:r>
-              <a:rPr lang="en-US" sz="2400" b="1" kern="0" dirty="0" smtClean="0">
-                <a:latin typeface="Calibri" pitchFamily="34" charset="0"/>
-                <a:ea typeface="+mj-ea"/>
-                <a:cs typeface="Calibri" pitchFamily="34" charset="0"/>
-              </a:rPr>
-              <a:t>sion </a:t>
-            </a:r>
-            <a:r>
-              <a:rPr lang="en-US" sz="2400" b="1" kern="0" dirty="0" smtClean="0">
-                <a:latin typeface="Calibri" pitchFamily="34" charset="0"/>
-                <a:ea typeface="+mj-ea"/>
-                <a:cs typeface="Calibri" pitchFamily="34" charset="0"/>
-              </a:rPr>
-              <a:t>Control Recommendations</a:t>
+              <a:t>Revision Control Recommendations</a:t>
             </a:r>
           </a:p>
           <a:p>
@@ -11823,29 +11975,18 @@
               <a:defRPr/>
             </a:pPr>
             <a:r>
-              <a:rPr lang="en-US" sz="2000" kern="0" smtClean="0">
-                <a:latin typeface="Calibri" pitchFamily="34" charset="0"/>
-                <a:ea typeface="+mj-ea"/>
-                <a:cs typeface="Calibri" pitchFamily="34" charset="0"/>
-              </a:rPr>
-              <a:t>August</a:t>
-            </a:r>
-            <a:r>
-              <a:rPr lang="en-US" sz="2000" kern="0" smtClean="0">
-                <a:latin typeface="Calibri" pitchFamily="34" charset="0"/>
-                <a:ea typeface="+mj-ea"/>
-                <a:cs typeface="Calibri" pitchFamily="34" charset="0"/>
-              </a:rPr>
-              <a:t> </a:t>
-            </a:r>
-            <a:r>
               <a:rPr lang="en-US" sz="2000" kern="0" dirty="0" smtClean="0">
                 <a:latin typeface="Calibri" pitchFamily="34" charset="0"/>
                 <a:ea typeface="+mj-ea"/>
                 <a:cs typeface="Calibri" pitchFamily="34" charset="0"/>
               </a:rPr>
-              <a:t>2014</a:t>
-            </a:r>
+              <a:t>February 2015</a:t>
+            </a:r>
+            <a:endParaRPr lang="en-US" sz="2000" kern="0" dirty="0" smtClean="0">
+              <a:latin typeface="Calibri" pitchFamily="34" charset="0"/>
+              <a:ea typeface="+mj-ea"/>
+              <a:cs typeface="Calibri" pitchFamily="34" charset="0"/>
+            </a:endParaRPr>
           </a:p>
         </p:txBody>
       </p:sp>
@@ -11983,7 +12124,23 @@
             </a:r>
             <a:r>
               <a:rPr lang="en-US" baseline="0" dirty="0" smtClean="0"/>
-              <a:t> a small project just for IP</a:t>
+              <a:t> a small </a:t>
+            </a:r>
+            <a:r>
+              <a:rPr lang="en-US" baseline="0" dirty="0" smtClean="0"/>
+              <a:t>“managed </a:t>
+            </a:r>
+            <a:r>
+              <a:rPr lang="en-US" baseline="0" dirty="0" err="1" smtClean="0"/>
+              <a:t>ip</a:t>
+            </a:r>
+            <a:r>
+              <a:rPr lang="en-US" baseline="0" dirty="0" smtClean="0"/>
+              <a:t>” project </a:t>
+            </a:r>
+            <a:r>
+              <a:rPr lang="en-US" baseline="0" dirty="0" smtClean="0"/>
+              <a:t>for IP</a:t>
             </a:r>
           </a:p>
           <a:p>
@@ -12202,20 +12359,6 @@
               </a:rPr>
               <a:t>Important!</a:t>
             </a:r>
-            <a:endParaRPr kumimoji="0" lang="en-US" sz="2000" b="1" i="0" u="none" strike="noStrike" kern="0" cap="none" spc="0" normalizeH="0" baseline="0" noProof="0" dirty="0" smtClean="0">
-              <a:ln>
-                <a:noFill/>
-              </a:ln>
-              <a:solidFill>
-                <a:srgbClr val="FF0000"/>
-              </a:solidFill>
-              <a:effectLst/>
-              <a:uLnTx/>
-              <a:uFillTx/>
-              <a:latin typeface="+mn-lt"/>
-              <a:ea typeface="+mn-ea"/>
-              <a:cs typeface="+mn-cs"/>
-            </a:endParaRPr>
           </a:p>
         </p:txBody>
       </p:sp>
@@ -12269,7 +12412,7 @@
         <p:spPr>
           <a:xfrm>
             <a:off x="364599" y="1327150"/>
-            <a:ext cx="6418163" cy="4268337"/>
+            <a:ext cx="6047775" cy="4268337"/>
           </a:xfrm>
         </p:spPr>
         <p:txBody>
@@ -12278,36 +12421,82 @@
           <a:p>
             <a:r>
               <a:rPr lang="en-US" dirty="0" smtClean="0"/>
-              <a:t>Build System Generator in a Standalone directory</a:t>
-            </a:r>
+              <a:t>Build System </a:t>
+            </a:r>
+            <a:r>
+              <a:rPr lang="en-US" dirty="0" smtClean="0"/>
+              <a:t>Generator </a:t>
+            </a:r>
+            <a:r>
+              <a:rPr lang="en-US" dirty="0" smtClean="0"/>
+              <a:t>“</a:t>
+            </a:r>
+            <a:r>
+              <a:rPr lang="en-US" dirty="0" smtClean="0"/>
+              <a:t>Standalone”</a:t>
+            </a:r>
+            <a:endParaRPr lang="en-US" dirty="0" smtClean="0"/>
           </a:p>
           <a:p>
             <a:pPr lvl="1"/>
             <a:r>
               <a:rPr lang="en-US" dirty="0" smtClean="0"/>
-              <a:t>Like IP – separated from project</a:t>
-            </a:r>
+              <a:t>vs</a:t>
+            </a:r>
+            <a:r>
+              <a:rPr lang="en-US" dirty="0" smtClean="0"/>
+              <a:t> “composite” integration mode with </a:t>
+            </a:r>
+            <a:r>
+              <a:rPr lang="en-US" dirty="0" err="1" smtClean="0"/>
+              <a:t>Vivado</a:t>
+            </a:r>
+            <a:endParaRPr lang="en-US" dirty="0" smtClean="0"/>
           </a:p>
           <a:p>
             <a:pPr lvl="1"/>
             <a:r>
-              <a:rPr lang="en-US" dirty="0"/>
-              <a:t>C</a:t>
-            </a:r>
-            <a:r>
-              <a:rPr lang="en-US" dirty="0" smtClean="0"/>
-              <a:t>urrently doesn’t support </a:t>
-            </a:r>
-            <a:r>
-              <a:rPr lang="en-US" dirty="0" smtClean="0"/>
-              <a:t>OOC</a:t>
+              <a:rPr lang="en-US" dirty="0" smtClean="0"/>
+              <a:t>Package </a:t>
+            </a:r>
+            <a:r>
+              <a:rPr lang="en-US" dirty="0" err="1" smtClean="0"/>
+              <a:t>S</a:t>
+            </a:r>
+            <a:r>
+              <a:rPr lang="en-US" dirty="0" err="1" smtClean="0"/>
+              <a:t>ysGen</a:t>
+            </a:r>
+            <a:r>
+              <a:rPr lang="en-US" smtClean="0"/>
+              <a:t> Block </a:t>
+            </a:r>
+            <a:r>
+              <a:rPr lang="en-US" dirty="0" smtClean="0"/>
+              <a:t>like any other custom </a:t>
+            </a:r>
+            <a:r>
+              <a:rPr lang="en-US" dirty="0" smtClean="0"/>
+              <a:t>IP </a:t>
             </a:r>
           </a:p>
           <a:p>
             <a:pPr lvl="1"/>
             <a:r>
               <a:rPr lang="en-US" dirty="0" smtClean="0"/>
-              <a:t>Make sure it is fully generated (RTL)</a:t>
+              <a:t>IP repo used in IPI or Managed IP project for RTL</a:t>
+            </a:r>
+            <a:endParaRPr lang="en-US" dirty="0" smtClean="0"/>
+          </a:p>
+          <a:p>
+            <a:pPr lvl="1"/>
+            <a:r>
+              <a:rPr lang="en-US" dirty="0" smtClean="0"/>
+              <a:t>Make sure it is fully generated (RTL</a:t>
+            </a:r>
+            <a:r>
+              <a:rPr lang="en-US" dirty="0" smtClean="0"/>
+              <a:t>) with DCP (OOC)</a:t>
             </a:r>
             <a:endParaRPr lang="en-US" dirty="0" smtClean="0"/>
           </a:p>
@@ -12328,6 +12517,10 @@
               <a:t>Entire directory, including </a:t>
             </a:r>
             <a:r>
+              <a:rPr lang="en-US" dirty="0" smtClean="0"/>
+              <a:t>all </a:t>
+            </a:r>
+            <a:r>
               <a:rPr lang="en-US" dirty="0" err="1" smtClean="0"/>
               <a:t>subdirs</a:t>
             </a:r>
@@ -12340,21 +12533,24 @@
           <a:p>
             <a:r>
               <a:rPr lang="en-US" dirty="0" smtClean="0"/>
-              <a:t>Add .</a:t>
-            </a:r>
-            <a:r>
-              <a:rPr lang="en-US" dirty="0" err="1" smtClean="0"/>
-              <a:t>slx</a:t>
-            </a:r>
-            <a:r>
-              <a:rPr lang="en-US" dirty="0" smtClean="0"/>
-              <a:t> to top </a:t>
-            </a:r>
-            <a:r>
-              <a:rPr lang="en-US" dirty="0" smtClean="0"/>
-              <a:t>project as a remote source</a:t>
-            </a:r>
-            <a:endParaRPr lang="en-US" dirty="0" smtClean="0"/>
+              <a:t>Add </a:t>
+            </a:r>
+            <a:r>
+              <a:rPr lang="en-US" dirty="0" smtClean="0"/>
+              <a:t>.</a:t>
+            </a:r>
+            <a:r>
+              <a:rPr lang="en-US" dirty="0" smtClean="0"/>
+              <a:t>xci</a:t>
+            </a:r>
+            <a:r>
+              <a:rPr lang="en-US" dirty="0" smtClean="0"/>
+              <a:t> </a:t>
+            </a:r>
+            <a:r>
+              <a:rPr lang="en-US" dirty="0" smtClean="0"/>
+              <a:t>to top project as a remote source</a:t>
+            </a:r>
           </a:p>
           <a:p>
             <a:pPr lvl="1"/>
@@ -12376,48 +12572,13 @@
             </a:r>
             <a:r>
               <a:rPr lang="en-US" dirty="0" smtClean="0"/>
-              <a:t> command, relative file path</a:t>
+              <a:t> command, relative file </a:t>
+            </a:r>
+            <a:r>
+              <a:rPr lang="en-US" dirty="0" smtClean="0"/>
+              <a:t>path</a:t>
             </a:r>
             <a:endParaRPr lang="en-US" dirty="0"/>
-          </a:p>
-          <a:p>
-            <a:pPr lvl="1"/>
-            <a:r>
-              <a:rPr lang="en-US" dirty="0" smtClean="0"/>
-              <a:t>No </a:t>
-            </a:r>
-            <a:r>
-              <a:rPr lang="en-US" dirty="0" err="1" smtClean="0"/>
-              <a:t>Matlab</a:t>
-            </a:r>
-            <a:r>
-              <a:rPr lang="en-US" dirty="0" smtClean="0"/>
-              <a:t> </a:t>
-            </a:r>
-            <a:r>
-              <a:rPr lang="en-US" dirty="0" smtClean="0"/>
-              <a:t>license </a:t>
-            </a:r>
-            <a:r>
-              <a:rPr lang="en-US" dirty="0" smtClean="0"/>
-              <a:t>required</a:t>
-            </a:r>
-          </a:p>
-          <a:p>
-            <a:pPr lvl="1"/>
-            <a:r>
-              <a:rPr lang="en-US" dirty="0" smtClean="0"/>
-              <a:t>If you add via GUI, it will require a </a:t>
-            </a:r>
-            <a:r>
-              <a:rPr lang="en-US" dirty="0" err="1" smtClean="0"/>
-              <a:t>Matlab</a:t>
-            </a:r>
-            <a:r>
-              <a:rPr lang="en-US" dirty="0" smtClean="0"/>
-              <a:t> license and copy it locally</a:t>
-            </a:r>
-            <a:endParaRPr lang="en-US" dirty="0" smtClean="0"/>
           </a:p>
         </p:txBody>
       </p:sp>
@@ -12446,7 +12607,7 @@
       </p:sp>
       <p:pic>
         <p:nvPicPr>
-          <p:cNvPr id="4" name="Picture 3"/>
+          <p:cNvPr id="8" name="Picture 7"/>
           <p:cNvPicPr>
             <a:picLocks noChangeAspect="1"/>
           </p:cNvPicPr>
@@ -12466,8 +12627,8 @@
         </p:blipFill>
         <p:spPr>
           <a:xfrm>
-            <a:off x="6676680" y="1333529"/>
-            <a:ext cx="2467320" cy="2343477"/>
+            <a:off x="6524259" y="1112469"/>
+            <a:ext cx="2619741" cy="3515216"/>
           </a:xfrm>
           <a:prstGeom prst="rect">
             <a:avLst/>
@@ -12482,7 +12643,7 @@
         </p:nvSpPr>
         <p:spPr bwMode="auto">
           <a:xfrm>
-            <a:off x="6681622" y="2006081"/>
+            <a:off x="6524259" y="3128826"/>
             <a:ext cx="1436913" cy="298580"/>
           </a:xfrm>
           <a:prstGeom prst="roundRect">
@@ -12576,11 +12737,7 @@
             </a:r>
             <a:r>
               <a:rPr lang="en-US" baseline="0" dirty="0" smtClean="0"/>
-              <a:t> </a:t>
-            </a:r>
-            <a:r>
-              <a:rPr lang="en-US" baseline="0" dirty="0" smtClean="0"/>
-              <a:t>File Life Cycle</a:t>
+              <a:t> File Life Cycle</a:t>
             </a:r>
             <a:endParaRPr lang="en-US" dirty="0"/>
           </a:p>
@@ -14030,11 +14187,7 @@
             </a:r>
             <a:r>
               <a:rPr lang="en-US" sz="2000" dirty="0" smtClean="0"/>
-              <a:t>) </a:t>
-            </a:r>
-            <a:r>
-              <a:rPr lang="en-US" sz="2000" dirty="0" smtClean="0"/>
-              <a:t>– 1/2</a:t>
+              <a:t>) – 1/2</a:t>
             </a:r>
             <a:endParaRPr lang="en-US" sz="2000" dirty="0"/>
           </a:p>
@@ -15430,11 +15583,6 @@
               </a:rPr>
               <a:t>This is a Tab Character – don’t forget it!</a:t>
             </a:r>
-            <a:endParaRPr lang="en-US" dirty="0" smtClean="0">
-              <a:solidFill>
-                <a:srgbClr val="000000"/>
-              </a:solidFill>
-            </a:endParaRPr>
           </a:p>
         </p:txBody>
       </p:sp>
@@ -16484,11 +16632,7 @@
           <a:p>
             <a:r>
               <a:rPr lang="en-US" dirty="0" smtClean="0"/>
-              <a:t>Lab </a:t>
-            </a:r>
-            <a:r>
-              <a:rPr lang="en-US" dirty="0" smtClean="0"/>
-              <a:t>1</a:t>
+              <a:t>Lab 1</a:t>
             </a:r>
             <a:endParaRPr lang="en-US" dirty="0"/>
           </a:p>
@@ -16592,11 +16736,7 @@
           <a:p>
             <a:r>
               <a:rPr lang="en-US" dirty="0" smtClean="0"/>
-              <a:t>Lab </a:t>
-            </a:r>
-            <a:r>
-              <a:rPr lang="en-US" dirty="0" smtClean="0"/>
-              <a:t>2</a:t>
+              <a:t>Lab 2</a:t>
             </a:r>
             <a:endParaRPr lang="en-US" dirty="0"/>
           </a:p>
@@ -16765,11 +16905,7 @@
             </a:r>
             <a:r>
               <a:rPr lang="en-US" baseline="0" dirty="0" smtClean="0"/>
-              <a:t> </a:t>
-            </a:r>
-            <a:r>
-              <a:rPr lang="en-US" baseline="0" dirty="0" smtClean="0"/>
-              <a:t>3</a:t>
+              <a:t> 3</a:t>
             </a:r>
             <a:endParaRPr lang="en-US" dirty="0"/>
           </a:p>
@@ -17061,11 +17197,7 @@
           <a:p>
             <a:r>
               <a:rPr lang="en-US" dirty="0" smtClean="0"/>
-              <a:t>Lab </a:t>
-            </a:r>
-            <a:r>
-              <a:rPr lang="en-US" dirty="0" smtClean="0"/>
-              <a:t>4</a:t>
+              <a:t>Lab 4</a:t>
             </a:r>
             <a:endParaRPr lang="en-US" dirty="0"/>
           </a:p>
@@ -17163,11 +17295,7 @@
           <a:p>
             <a:r>
               <a:rPr lang="en-US" dirty="0" smtClean="0"/>
-              <a:t>Lab </a:t>
-            </a:r>
-            <a:r>
-              <a:rPr lang="en-US" dirty="0" smtClean="0"/>
-              <a:t>5</a:t>
+              <a:t>Lab 5</a:t>
             </a:r>
             <a:endParaRPr lang="en-US" dirty="0"/>
           </a:p>
@@ -17303,23 +17431,7 @@
             </a:r>
             <a:r>
               <a:rPr lang="en-US" dirty="0" smtClean="0"/>
-              <a:t> </a:t>
-            </a:r>
-            <a:r>
-              <a:rPr lang="en-US" dirty="0" smtClean="0"/>
-              <a:t>HDL</a:t>
-            </a:r>
-            <a:r>
-              <a:rPr lang="en-US" dirty="0" smtClean="0"/>
-              <a:t> </a:t>
-            </a:r>
-            <a:r>
-              <a:rPr lang="en-US" dirty="0" smtClean="0"/>
-              <a:t>and </a:t>
-            </a:r>
-            <a:r>
-              <a:rPr lang="en-US" dirty="0" smtClean="0"/>
-              <a:t>links</a:t>
+              <a:t> HDL and links</a:t>
             </a:r>
           </a:p>
         </p:txBody>
@@ -17341,11 +17453,7 @@
           <a:p>
             <a:r>
               <a:rPr lang="en-US" dirty="0" smtClean="0"/>
-              <a:t>Lab </a:t>
-            </a:r>
-            <a:r>
-              <a:rPr lang="en-US" dirty="0" smtClean="0"/>
-              <a:t>6</a:t>
+              <a:t>Lab 6</a:t>
             </a:r>
             <a:endParaRPr lang="en-US" dirty="0"/>
           </a:p>
@@ -17757,15 +17865,7 @@
             <a:pPr lvl="1"/>
             <a:r>
               <a:rPr lang="en-US" dirty="0" smtClean="0"/>
-              <a:t>Generally </a:t>
-            </a:r>
-            <a:r>
-              <a:rPr lang="en-US" dirty="0" smtClean="0"/>
-              <a:t>prefer </a:t>
-            </a:r>
-            <a:r>
-              <a:rPr lang="en-US" dirty="0" smtClean="0"/>
-              <a:t>ASCII-based internal files (xml project files)</a:t>
+              <a:t>Generally prefer ASCII-based internal files (xml project files)</a:t>
             </a:r>
           </a:p>
           <a:p>
@@ -17779,15 +17879,7 @@
             <a:pPr lvl="1"/>
             <a:r>
               <a:rPr lang="en-US" dirty="0" smtClean="0"/>
-              <a:t>Tolerate hidden “dot” files inserted by </a:t>
-            </a:r>
-            <a:r>
-              <a:rPr lang="en-US" dirty="0" smtClean="0"/>
-              <a:t>revision control </a:t>
-            </a:r>
-            <a:r>
-              <a:rPr lang="en-US" dirty="0" smtClean="0"/>
-              <a:t>tools</a:t>
+              <a:t>Tolerate hidden “dot” files inserted by revision control tools</a:t>
             </a:r>
           </a:p>
           <a:p>
@@ -17887,11 +17979,7 @@
             </a:r>
             <a:r>
               <a:rPr lang="en-US" baseline="0" dirty="0" smtClean="0"/>
-              <a:t>Revision </a:t>
-            </a:r>
-            <a:r>
-              <a:rPr lang="en-US" baseline="0" dirty="0" smtClean="0"/>
-              <a:t>Control Philosophy</a:t>
+              <a:t>Revision Control Philosophy</a:t>
             </a:r>
             <a:endParaRPr lang="en-US" dirty="0"/>
           </a:p>
@@ -18037,8 +18125,13 @@
             <a:pPr lvl="1"/>
             <a:r>
               <a:rPr lang="en-US" dirty="0" smtClean="0"/>
-              <a:t>Doesn’t currently work w/ remote sources</a:t>
-            </a:r>
+              <a:t>R</a:t>
+            </a:r>
+            <a:r>
+              <a:rPr lang="en-US" dirty="0" smtClean="0"/>
+              <a:t>emote sources beginning in 2015.1 (until then easy workaround)</a:t>
+            </a:r>
+            <a:endParaRPr lang="en-US" dirty="0" smtClean="0"/>
           </a:p>
           <a:p>
             <a:r>
@@ -18062,11 +18155,7 @@
             </a:r>
             <a:r>
               <a:rPr lang="en-US" dirty="0" smtClean="0"/>
-              <a:t>eproduce the project given input </a:t>
-            </a:r>
-            <a:r>
-              <a:rPr lang="en-US" dirty="0" smtClean="0"/>
-              <a:t>sources</a:t>
+              <a:t>eproduce the project given input sources</a:t>
             </a:r>
           </a:p>
           <a:p>
@@ -18083,7 +18172,6 @@
               <a:rPr lang="en-US" dirty="0" smtClean="0"/>
               <a:t> sources</a:t>
             </a:r>
-            <a:endParaRPr lang="en-US" dirty="0" smtClean="0"/>
           </a:p>
           <a:p>
             <a:r>
@@ -18508,7 +18596,7 @@
           <p:nvPr>
             <p:extLst>
               <p:ext uri="{D42A27DB-BD31-4B8C-83A1-F6EECF244321}">
-                <p14:modId xmlns:p14="http://schemas.microsoft.com/office/powerpoint/2010/main" val="2771031266"/>
+                <p14:modId xmlns:p14="http://schemas.microsoft.com/office/powerpoint/2010/main" val="3601516451"/>
               </p:ext>
             </p:extLst>
           </p:nvPr>
@@ -18744,7 +18832,15 @@
                             <a:srgbClr val="000000"/>
                           </a:solidFill>
                         </a:rPr>
-                        <a:t>Sys Gen SLX (entire </a:t>
+                        <a:t>Sys Gen </a:t>
+                      </a:r>
+                      <a:r>
+                        <a:rPr lang="en-US" dirty="0" smtClean="0">
+                          <a:solidFill>
+                            <a:srgbClr val="000000"/>
+                          </a:solidFill>
+                        </a:rPr>
+                        <a:t>IP XCI (entire </a:t>
                       </a:r>
                       <a:r>
                         <a:rPr lang="en-US" dirty="0" err="1" smtClean="0">
@@ -19087,22 +19183,14 @@
             </a:r>
             <a:r>
               <a:rPr lang="en-US" sz="1600" dirty="0" smtClean="0"/>
-              <a:t>, . </a:t>
-            </a:r>
+              <a:t>, . Xml)</a:t>
+            </a:r>
+          </a:p>
+          <a:p>
+            <a:pPr lvl="1"/>
             <a:r>
               <a:rPr lang="en-US" sz="1600" dirty="0" smtClean="0"/>
-              <a:t>Xml)</a:t>
-            </a:r>
-          </a:p>
-          <a:p>
-            <a:pPr lvl="1"/>
-            <a:r>
-              <a:rPr lang="en-US" sz="1600" dirty="0" smtClean="0"/>
-              <a:t>all </a:t>
-            </a:r>
-            <a:r>
-              <a:rPr lang="en-US" sz="1600" dirty="0" smtClean="0"/>
-              <a:t>subdirectories</a:t>
+              <a:t>all subdirectories</a:t>
             </a:r>
           </a:p>
           <a:p>
@@ -19112,11 +19200,7 @@
           <a:p>
             <a:r>
               <a:rPr lang="en-US" sz="1800" dirty="0" smtClean="0"/>
-              <a:t>Instantiate </a:t>
-            </a:r>
-            <a:r>
-              <a:rPr lang="en-US" sz="1800" dirty="0" smtClean="0"/>
-              <a:t>- </a:t>
+              <a:t>Instantiate - </a:t>
             </a:r>
             <a:r>
               <a:rPr lang="en-US" sz="1800" dirty="0"/>
@@ -19124,19 +19208,7 @@
             </a:r>
             <a:r>
               <a:rPr lang="en-US" sz="1800" dirty="0" smtClean="0"/>
-              <a:t>dding </a:t>
-            </a:r>
-            <a:r>
-              <a:rPr lang="en-US" sz="1800" dirty="0" smtClean="0"/>
-              <a:t>.xci </a:t>
-            </a:r>
-            <a:r>
-              <a:rPr lang="en-US" sz="1800" dirty="0" smtClean="0"/>
-              <a:t>as </a:t>
-            </a:r>
-            <a:r>
-              <a:rPr lang="en-US" sz="1800" dirty="0" smtClean="0"/>
-              <a:t>remote source</a:t>
+              <a:t>dding .xci as remote source</a:t>
             </a:r>
           </a:p>
           <a:p>
@@ -19150,15 +19222,7 @@
             <a:pPr lvl="1"/>
             <a:r>
               <a:rPr lang="en-US" sz="1600" dirty="0" smtClean="0"/>
-              <a:t>Must be fully generated, </a:t>
-            </a:r>
-            <a:r>
-              <a:rPr lang="en-US" sz="1600" dirty="0" smtClean="0"/>
-              <a:t>preferably </a:t>
-            </a:r>
-            <a:r>
-              <a:rPr lang="en-US" sz="1600" dirty="0" smtClean="0"/>
-              <a:t>w/ </a:t>
+              <a:t>Must be fully generated, preferably w/ </a:t>
             </a:r>
             <a:r>
               <a:rPr lang="en-US" sz="1600" dirty="0" err="1" smtClean="0"/>
@@ -19402,14 +19466,22 @@
           <a:p>
             <a:r>
               <a:rPr lang="en-US" dirty="0" smtClean="0"/>
-              <a:t>Create the block diagram in a remote directory</a:t>
+              <a:t>Create the block diagram in a remote </a:t>
+            </a:r>
+            <a:r>
+              <a:rPr lang="en-US" dirty="0" smtClean="0"/>
+              <a:t>directory</a:t>
             </a:r>
           </a:p>
           <a:p>
             <a:pPr lvl="1"/>
             <a:r>
               <a:rPr lang="en-US" dirty="0" smtClean="0"/>
-              <a:t>Just like IP, and make sure it is fully generated</a:t>
+              <a:t>Just </a:t>
+            </a:r>
+            <a:r>
+              <a:rPr lang="en-US" dirty="0" smtClean="0"/>
+              <a:t>like IP, and make sure it is fully generated</a:t>
             </a:r>
           </a:p>
           <a:p>
@@ -20368,6 +20440,21 @@
 </file>
 
 <file path=customXml/item1.xml><?xml version="1.0" encoding="utf-8"?>
+<?mso-contentType ?>
+<FormTemplates xmlns="http://schemas.microsoft.com/sharepoint/v3/contenttype/forms">
+  <Display>DocumentLibraryForm</Display>
+  <Edit>DocumentLibraryForm</Edit>
+  <New>DocumentLibraryForm</New>
+</FormTemplates>
+</file>
+
+<file path=customXml/item2.xml><?xml version="1.0" encoding="utf-8"?>
+<p:properties xmlns:p="http://schemas.microsoft.com/office/2006/metadata/properties" xmlns:xsi="http://www.w3.org/2001/XMLSchema-instance" xmlns:pc="http://schemas.microsoft.com/office/infopath/2007/PartnerControls">
+  <documentManagement/>
+</p:properties>
+</file>
+
+<file path=customXml/item3.xml><?xml version="1.0" encoding="utf-8"?>
 <ct:contentTypeSchema xmlns:ct="http://schemas.microsoft.com/office/2006/metadata/contentType" xmlns:ma="http://schemas.microsoft.com/office/2006/metadata/properties/metaAttributes" ct:_="" ma:_="" ma:contentTypeName="Document" ma:contentTypeID="0x0101009FF7D9ACD620714D8FBB4D60D145DB4F" ma:contentTypeVersion="0" ma:contentTypeDescription="Create a new document." ma:contentTypeScope="" ma:versionID="4bbc07a174f573dfbe0296acaebf4d5b">
   <xsd:schema xmlns:xsd="http://www.w3.org/2001/XMLSchema" xmlns:xs="http://www.w3.org/2001/XMLSchema" xmlns:p="http://schemas.microsoft.com/office/2006/metadata/properties" targetNamespace="http://schemas.microsoft.com/office/2006/metadata/properties" ma:root="true" ma:fieldsID="c64490b4aec6201516c3a874156f37b2">
     <xsd:element name="properties">
@@ -20481,22 +20568,30 @@
 </ct:contentTypeSchema>
 </file>
 
-<file path=customXml/item2.xml><?xml version="1.0" encoding="utf-8"?>
-<p:properties xmlns:p="http://schemas.microsoft.com/office/2006/metadata/properties" xmlns:xsi="http://www.w3.org/2001/XMLSchema-instance" xmlns:pc="http://schemas.microsoft.com/office/infopath/2007/PartnerControls">
-  <documentManagement/>
-</p:properties>
+<file path=customXml/itemProps1.xml><?xml version="1.0" encoding="utf-8"?>
+<ds:datastoreItem xmlns:ds="http://schemas.openxmlformats.org/officeDocument/2006/customXml" ds:itemID="{56EA677F-09E4-40FC-B998-315C6F85D97B}">
+  <ds:schemaRefs>
+    <ds:schemaRef ds:uri="http://schemas.microsoft.com/sharepoint/v3/contenttype/forms"/>
+  </ds:schemaRefs>
+</ds:datastoreItem>
 </file>
 
-<file path=customXml/item3.xml><?xml version="1.0" encoding="utf-8"?>
-<?mso-contentType ?>
-<FormTemplates xmlns="http://schemas.microsoft.com/sharepoint/v3/contenttype/forms">
-  <Display>DocumentLibraryForm</Display>
-  <Edit>DocumentLibraryForm</Edit>
-  <New>DocumentLibraryForm</New>
-</FormTemplates>
+<file path=customXml/itemProps2.xml><?xml version="1.0" encoding="utf-8"?>
+<ds:datastoreItem xmlns:ds="http://schemas.openxmlformats.org/officeDocument/2006/customXml" ds:itemID="{93D979BB-29AC-43F0-A6B8-B619DB8E98DE}">
+  <ds:schemaRefs>
+    <ds:schemaRef ds:uri="http://purl.org/dc/dcmitype/"/>
+    <ds:schemaRef ds:uri="http://purl.org/dc/terms/"/>
+    <ds:schemaRef ds:uri="http://purl.org/dc/elements/1.1/"/>
+    <ds:schemaRef ds:uri="http://www.w3.org/XML/1998/namespace"/>
+    <ds:schemaRef ds:uri="http://schemas.openxmlformats.org/package/2006/metadata/core-properties"/>
+    <ds:schemaRef ds:uri="http://schemas.microsoft.com/office/2006/documentManagement/types"/>
+    <ds:schemaRef ds:uri="http://schemas.microsoft.com/office/infopath/2007/PartnerControls"/>
+    <ds:schemaRef ds:uri="http://schemas.microsoft.com/office/2006/metadata/properties"/>
+  </ds:schemaRefs>
+</ds:datastoreItem>
 </file>
 
-<file path=customXml/itemProps1.xml><?xml version="1.0" encoding="utf-8"?>
+<file path=customXml/itemProps3.xml><?xml version="1.0" encoding="utf-8"?>
 <ds:datastoreItem xmlns:ds="http://schemas.openxmlformats.org/officeDocument/2006/customXml" ds:itemID="{63A6CF10-4272-4792-86D6-C2A00A3F8DBF}">
   <ds:schemaRefs>
     <ds:schemaRef ds:uri="http://schemas.microsoft.com/office/2006/metadata/contentType"/>
@@ -20510,27 +20605,4 @@
     <ds:schemaRef ds:uri="http://schemas.microsoft.com/office/infopath/2007/PartnerControls"/>
   </ds:schemaRefs>
 </ds:datastoreItem>
-</file>
-
-<file path=customXml/itemProps2.xml><?xml version="1.0" encoding="utf-8"?>
-<ds:datastoreItem xmlns:ds="http://schemas.openxmlformats.org/officeDocument/2006/customXml" ds:itemID="{93D979BB-29AC-43F0-A6B8-B619DB8E98DE}">
-  <ds:schemaRefs>
-    <ds:schemaRef ds:uri="http://purl.org/dc/dcmitype/"/>
-    <ds:schemaRef ds:uri="http://schemas.microsoft.com/office/infopath/2007/PartnerControls"/>
-    <ds:schemaRef ds:uri="http://purl.org/dc/elements/1.1/"/>
-    <ds:schemaRef ds:uri="http://schemas.microsoft.com/office/2006/documentManagement/types"/>
-    <ds:schemaRef ds:uri="http://purl.org/dc/terms/"/>
-    <ds:schemaRef ds:uri="http://schemas.microsoft.com/office/2006/metadata/properties"/>
-    <ds:schemaRef ds:uri="http://www.w3.org/XML/1998/namespace"/>
-    <ds:schemaRef ds:uri="http://schemas.openxmlformats.org/package/2006/metadata/core-properties"/>
-  </ds:schemaRefs>
-</ds:datastoreItem>
-</file>
-
-<file path=customXml/itemProps3.xml><?xml version="1.0" encoding="utf-8"?>
-<ds:datastoreItem xmlns:ds="http://schemas.openxmlformats.org/officeDocument/2006/customXml" ds:itemID="{56EA677F-09E4-40FC-B998-315C6F85D97B}">
-  <ds:schemaRefs>
-    <ds:schemaRef ds:uri="http://schemas.microsoft.com/sharepoint/v3/contenttype/forms"/>
-  </ds:schemaRefs>
-</ds:datastoreItem>
 </file>
</xml_diff>

<commit_message>
updated pptx with corrections and feedback
</commit_message>
<xml_diff>
--- a/doc/versionControl.pptx
+++ b/doc/versionControl.pptx
@@ -386,11 +386,11 @@
         </c:dLbls>
         <c:bubbleScale val="100"/>
         <c:showNegBubbles val="0"/>
-        <c:axId val="481357528"/>
-        <c:axId val="262568192"/>
+        <c:axId val="239319016"/>
+        <c:axId val="239319408"/>
       </c:bubbleChart>
       <c:valAx>
-        <c:axId val="481357528"/>
+        <c:axId val="239319016"/>
         <c:scaling>
           <c:orientation val="minMax"/>
         </c:scaling>
@@ -499,12 +499,12 @@
             <a:endParaRPr lang="en-US"/>
           </a:p>
         </c:txPr>
-        <c:crossAx val="262568192"/>
+        <c:crossAx val="239319408"/>
         <c:crosses val="autoZero"/>
         <c:crossBetween val="midCat"/>
       </c:valAx>
       <c:valAx>
-        <c:axId val="262568192"/>
+        <c:axId val="239319408"/>
         <c:scaling>
           <c:orientation val="minMax"/>
         </c:scaling>
@@ -613,7 +613,7 @@
             <a:endParaRPr lang="en-US"/>
           </a:p>
         </c:txPr>
-        <c:crossAx val="481357528"/>
+        <c:crossAx val="239319016"/>
         <c:crosses val="autoZero"/>
         <c:crossBetween val="midCat"/>
       </c:valAx>
@@ -4590,7 +4590,7 @@
             <a:fld id="{3603A3DC-285A-48EF-A6A9-13284B292DDB}" type="datetimeFigureOut">
               <a:rPr lang="en-US" smtClean="0"/>
               <a:pPr/>
-              <a:t>6/30/2015</a:t>
+              <a:t>7/2/2015</a:t>
             </a:fld>
             <a:endParaRPr lang="en-US" dirty="0"/>
           </a:p>
@@ -5208,11 +5208,7 @@
           <a:p>
             <a:r>
               <a:rPr lang="en-US" baseline="0" dirty="0" smtClean="0"/>
-              <a:t>The primary recommendation is to use TCL otherwise use the XPR.  Make sure to test the XPR to make sure data is not missed and to check relative paths</a:t>
-            </a:r>
-            <a:r>
-              <a:rPr lang="en-US" baseline="0" dirty="0" smtClean="0"/>
-              <a:t>.</a:t>
+              <a:t>The primary recommendation is to use TCL otherwise use the XPR.  Make sure to test the XPR to make sure data is not missed and to check relative paths.</a:t>
             </a:r>
           </a:p>
           <a:p>
@@ -5221,11 +5217,7 @@
           <a:p>
             <a:r>
               <a:rPr lang="en-US" dirty="0" smtClean="0"/>
-              <a:t>We recommend checkin</a:t>
-            </a:r>
-            <a:r>
-              <a:rPr lang="en-US" dirty="0" smtClean="0"/>
-              <a:t>g in the entire directory structure for IP, BD, etc.  Trying to filter or limit the files will very likely corrupt the data and get you into trouble.</a:t>
+              <a:t>We recommend checking in the entire directory structure for IP, BD, etc.  Trying to filter or limit the files will very likely corrupt the data and get you into trouble.</a:t>
             </a:r>
             <a:endParaRPr lang="en-US" dirty="0"/>
           </a:p>
@@ -5391,11 +5383,7 @@
           <a:p>
             <a:r>
               <a:rPr lang="en-US" dirty="0" smtClean="0"/>
-              <a:t>If you must try to check in minimum data and recreat</a:t>
-            </a:r>
-            <a:r>
-              <a:rPr lang="en-US" dirty="0" smtClean="0"/>
-              <a:t>e everything – you will need something to create the project (either the </a:t>
+              <a:t>If you must try to check in minimum data and recreate everything – you will need something to create the project (either the </a:t>
             </a:r>
             <a:r>
               <a:rPr lang="en-US" dirty="0" err="1" smtClean="0"/>
@@ -5406,12 +5394,12 @@
               <a:t> file </a:t>
             </a:r>
             <a:r>
-              <a:rPr lang="en-US" dirty="0" err="1" smtClean="0"/>
-              <a:t>itseld</a:t>
-            </a:r>
-            <a:r>
-              <a:rPr lang="en-US" dirty="0" smtClean="0"/>
-              <a:t> or a </a:t>
+              <a:rPr lang="en-US" dirty="0" smtClean="0"/>
+              <a:t>itself </a:t>
+            </a:r>
+            <a:r>
+              <a:rPr lang="en-US" dirty="0" smtClean="0"/>
+              <a:t>or a </a:t>
             </a:r>
             <a:r>
               <a:rPr lang="en-US" dirty="0" err="1" smtClean="0"/>
@@ -5439,12 +5427,20 @@
               <a:t>Note that </a:t>
             </a:r>
             <a:r>
+              <a:rPr lang="en-US" dirty="0" err="1"/>
+              <a:t>V</a:t>
+            </a:r>
+            <a:r>
               <a:rPr lang="en-US" dirty="0" err="1" smtClean="0"/>
-              <a:t>vivado</a:t>
-            </a:r>
-            <a:r>
-              <a:rPr lang="en-US" dirty="0" smtClean="0"/>
-              <a:t> needs write permission to create the content you didn’t check in to revision control – and it will try to do that in the same location as the xci/</a:t>
+              <a:t>ivado</a:t>
+            </a:r>
+            <a:r>
+              <a:rPr lang="en-US" dirty="0" smtClean="0"/>
+              <a:t> </a:t>
+            </a:r>
+            <a:r>
+              <a:rPr lang="en-US" dirty="0" smtClean="0"/>
+              <a:t>needs write permission to create the content you didn’t check in to revision control – and it will try to do that in the same location as the xci/</a:t>
             </a:r>
             <a:r>
               <a:rPr lang="en-US" dirty="0" err="1" smtClean="0"/>
@@ -5462,7 +5458,6 @@
               <a:rPr lang="en-US" dirty="0" smtClean="0"/>
               <a:t> files your script for creating the top level project should copy them into the project – where they can be generated without running into issues with permission inside the repository.</a:t>
             </a:r>
-            <a:endParaRPr lang="en-US" dirty="0" smtClean="0"/>
           </a:p>
           <a:p>
             <a:endParaRPr lang="en-US" dirty="0"/>
@@ -5470,11 +5465,7 @@
           <a:p>
             <a:r>
               <a:rPr lang="en-US" dirty="0" smtClean="0"/>
-              <a:t>Note </a:t>
-            </a:r>
-            <a:r>
-              <a:rPr lang="en-US" dirty="0" smtClean="0"/>
-              <a:t>that some IP have side files – Block</a:t>
+              <a:t>Note that some IP have side files – Block</a:t>
             </a:r>
             <a:r>
               <a:rPr lang="en-US" baseline="0" dirty="0" smtClean="0"/>
@@ -5560,8 +5551,21 @@
           <a:p>
             <a:r>
               <a:rPr lang="en-US" dirty="0" smtClean="0"/>
-              <a:t>Scripts and other documentation collateral should also be managed in rev. ctrl.</a:t>
-            </a:r>
+              <a:t>Scripts and other documentation collateral should also be managed in </a:t>
+            </a:r>
+            <a:r>
+              <a:rPr lang="en-US" dirty="0" smtClean="0"/>
+              <a:t>rev</a:t>
+            </a:r>
+            <a:r>
+              <a:rPr lang="en-US" dirty="0" smtClean="0"/>
+              <a:t>ision control</a:t>
+            </a:r>
+            <a:r>
+              <a:rPr lang="en-US" dirty="0" smtClean="0"/>
+              <a:t>.</a:t>
+            </a:r>
+            <a:endParaRPr lang="en-US" dirty="0" smtClean="0"/>
           </a:p>
           <a:p>
             <a:endParaRPr lang="en-US" dirty="0"/>
@@ -5668,15 +5672,15 @@
           <a:p>
             <a:r>
               <a:rPr lang="en-US" dirty="0" smtClean="0"/>
-              <a:t>A:  We recommend the max. </a:t>
-            </a:r>
-            <a:r>
-              <a:rPr lang="en-US" dirty="0" err="1" smtClean="0"/>
-              <a:t>flexilibity</a:t>
-            </a:r>
-            <a:r>
-              <a:rPr lang="en-US" dirty="0" smtClean="0"/>
-              <a:t> approach because it insulates you from being forced to upgrade IP versions with </a:t>
+              <a:t>A:  We recommend the </a:t>
+            </a:r>
+            <a:r>
+              <a:rPr lang="en-US" dirty="0" smtClean="0"/>
+              <a:t>maximum flexibility </a:t>
+            </a:r>
+            <a:r>
+              <a:rPr lang="en-US" dirty="0" smtClean="0"/>
+              <a:t>approach because it insulates you from being forced to upgrade IP versions with </a:t>
             </a:r>
             <a:r>
               <a:rPr lang="en-US" dirty="0" err="1" smtClean="0"/>
@@ -5956,11 +5960,7 @@
           <a:p>
             <a:r>
               <a:rPr lang="en-US" dirty="0" smtClean="0"/>
-              <a:t>You have files that are either tracked or untracked.  Untracked files can be added to a configuration file so tha</a:t>
-            </a:r>
-            <a:r>
-              <a:rPr lang="en-US" dirty="0" smtClean="0"/>
-              <a:t>t the tools do not constantly report changes to these files.</a:t>
+              <a:t>You have files that are either tracked or untracked.  Untracked files can be added to a configuration file so that the tools do not constantly report changes to these files.</a:t>
             </a:r>
           </a:p>
           <a:p>
@@ -5994,15 +5994,15 @@
           <a:p>
             <a:r>
               <a:rPr lang="en-US" dirty="0" smtClean="0"/>
-              <a:t>You can always revert or back out changes at these commit levels or even on individual file edits if you need to </a:t>
-            </a:r>
-            <a:r>
-              <a:rPr lang="en-US" dirty="0" err="1" smtClean="0"/>
-              <a:t>to</a:t>
-            </a:r>
-            <a:r>
-              <a:rPr lang="en-US" dirty="0" smtClean="0"/>
-              <a:t> fix problems that get introduced.</a:t>
+              <a:t>You can always revert or back out changes at these commit levels or even on individual file edits if you need </a:t>
+            </a:r>
+            <a:r>
+              <a:rPr lang="en-US" dirty="0" smtClean="0"/>
+              <a:t>to </a:t>
+            </a:r>
+            <a:r>
+              <a:rPr lang="en-US" dirty="0" smtClean="0"/>
+              <a:t>fix problems that get introduced.</a:t>
             </a:r>
             <a:endParaRPr lang="en-US" dirty="0"/>
           </a:p>
@@ -6233,7 +6233,15 @@
           <a:p>
             <a:r>
               <a:rPr lang="en-US" dirty="0" smtClean="0"/>
-              <a:t>First there will be a brief review of what revision control methodology is important and why customers should be using it.</a:t>
+              <a:t>First there will be a brief review of </a:t>
+            </a:r>
+            <a:r>
+              <a:rPr lang="en-US" dirty="0" smtClean="0"/>
+              <a:t>why </a:t>
+            </a:r>
+            <a:r>
+              <a:rPr lang="en-US" dirty="0" smtClean="0"/>
+              <a:t>revision control methodology is important and why customers should be using it.</a:t>
             </a:r>
           </a:p>
           <a:p>
@@ -6267,8 +6275,21 @@
             </a:r>
             <a:r>
               <a:rPr lang="en-US" dirty="0" smtClean="0"/>
-              <a:t> as the revision control tool and a tool called “Make” to determine dependencies and control the flow of the build process to compile to a bit file.</a:t>
-            </a:r>
+              <a:t> as the revision control tool and a tool called “Make” to determine dependencies and control the flow of the build process to compile to a bit file</a:t>
+            </a:r>
+            <a:r>
+              <a:rPr lang="en-US" dirty="0" smtClean="0"/>
+              <a:t>.  </a:t>
+            </a:r>
+            <a:r>
+              <a:rPr lang="en-US" dirty="0" err="1" smtClean="0"/>
+              <a:t>Git</a:t>
+            </a:r>
+            <a:r>
+              <a:rPr lang="en-US" dirty="0" smtClean="0"/>
+              <a:t> is chosen here as a popular option, but the concepts translate and are applicable to any revision control tool.</a:t>
+            </a:r>
+            <a:endParaRPr lang="en-US" dirty="0" smtClean="0"/>
           </a:p>
           <a:p>
             <a:endParaRPr lang="en-US" dirty="0"/>
@@ -6344,12 +6365,12 @@
               <a:t>If you’ve never used Make – </a:t>
             </a:r>
             <a:r>
-              <a:rPr lang="en-US" dirty="0" err="1" smtClean="0"/>
-              <a:t>heres</a:t>
-            </a:r>
-            <a:r>
-              <a:rPr lang="en-US" dirty="0" smtClean="0"/>
-              <a:t> a brief tutorial on what it is and how it works.  There are also many tutorials on the web.  </a:t>
+              <a:rPr lang="en-US" dirty="0" smtClean="0"/>
+              <a:t>here is </a:t>
+            </a:r>
+            <a:r>
+              <a:rPr lang="en-US" dirty="0" smtClean="0"/>
+              <a:t>a brief tutorial on what it is and how it works.  There are also many tutorials on the web.  </a:t>
             </a:r>
           </a:p>
           <a:p>
@@ -6375,7 +6396,15 @@
           <a:p>
             <a:r>
               <a:rPr lang="en-US" dirty="0" smtClean="0"/>
-              <a:t>Make figures out the order of operations when targets depend on output products (files) from other targets.  So you build very complex compilation scripts – but only execute necessary steps when files change rather than rerunning everything all the time.</a:t>
+              <a:t>Make figures out the order of operations when targets depend on output products (files) from other targets.  So </a:t>
+            </a:r>
+            <a:r>
+              <a:rPr lang="en-US" dirty="0" smtClean="0"/>
+              <a:t>you can </a:t>
+            </a:r>
+            <a:r>
+              <a:rPr lang="en-US" dirty="0" smtClean="0"/>
+              <a:t>build very complex compilation scripts – but only execute necessary steps when files change rather than rerunning everything all the time.</a:t>
             </a:r>
           </a:p>
           <a:p>
@@ -6618,27 +6647,11 @@
           <a:p>
             <a:r>
               <a:rPr lang="en-US" dirty="0" smtClean="0"/>
-              <a:t>You </a:t>
-            </a:r>
-            <a:r>
-              <a:rPr lang="en-US" dirty="0" smtClean="0"/>
-              <a:t>should</a:t>
-            </a:r>
-            <a:r>
-              <a:rPr lang="en-US" dirty="0" smtClean="0"/>
-              <a:t> </a:t>
-            </a:r>
-            <a:r>
-              <a:rPr lang="en-US" dirty="0" smtClean="0"/>
-              <a:t>do the pre-work before attempting</a:t>
+              <a:t>You should do the pre-work before attempting</a:t>
             </a:r>
             <a:r>
               <a:rPr lang="en-US" baseline="0" dirty="0" smtClean="0"/>
-              <a:t> this </a:t>
-            </a:r>
-            <a:r>
-              <a:rPr lang="en-US" baseline="0" dirty="0" smtClean="0"/>
-              <a:t>lab.  </a:t>
+              <a:t> this lab.  </a:t>
             </a:r>
             <a:r>
               <a:rPr lang="en-US" dirty="0" smtClean="0"/>
@@ -7227,11 +7240,7 @@
             </a:r>
             <a:r>
               <a:rPr lang="en-US" baseline="0" dirty="0" smtClean="0"/>
-              <a:t> solution contains both approaches.  The TCL script contains a switch to control which revision control approach is desired</a:t>
-            </a:r>
-            <a:r>
-              <a:rPr lang="en-US" baseline="0" dirty="0" smtClean="0"/>
-              <a:t>.  It is controlled by</a:t>
+              <a:t> solution contains both approaches.  The TCL script contains a switch to control which revision control approach is desired.  It is controlled by</a:t>
             </a:r>
             <a:r>
               <a:rPr lang="en-US" dirty="0" smtClean="0"/>
@@ -7267,11 +7276,7 @@
             </a:r>
             <a:r>
               <a:rPr lang="en-US" dirty="0" smtClean="0"/>
-              <a:t> checked into th</a:t>
-            </a:r>
-            <a:r>
-              <a:rPr lang="en-US" dirty="0" smtClean="0"/>
-              <a:t>e golden </a:t>
+              <a:t> checked into the golden </a:t>
             </a:r>
             <a:r>
               <a:rPr lang="en-US" dirty="0" err="1" smtClean="0"/>
@@ -7282,12 +7287,12 @@
               <a:t> repo – this matches the primary recommendation and the maximum </a:t>
             </a:r>
             <a:r>
-              <a:rPr lang="en-US" dirty="0" err="1" smtClean="0"/>
-              <a:t>flexilbility</a:t>
-            </a:r>
-            <a:r>
-              <a:rPr lang="en-US" dirty="0" smtClean="0"/>
-              <a:t> use case.  Change it to false  and everything will be regenerated locally based on </a:t>
+              <a:rPr lang="en-US" dirty="0" smtClean="0"/>
+              <a:t>flexibility </a:t>
+            </a:r>
+            <a:r>
+              <a:rPr lang="en-US" dirty="0" smtClean="0"/>
+              <a:t>use case.  Change it to false  and everything will be regenerated locally based on </a:t>
             </a:r>
             <a:r>
               <a:rPr lang="en-US" dirty="0" err="1" smtClean="0"/>
@@ -7430,12 +7435,12 @@
               <a:t>We provided a lab with an example project showing </a:t>
             </a:r>
             <a:r>
-              <a:rPr lang="en-US" dirty="0" err="1" smtClean="0"/>
-              <a:t>commong</a:t>
-            </a:r>
-            <a:r>
-              <a:rPr lang="en-US" dirty="0" smtClean="0"/>
-              <a:t> setup and workflow using </a:t>
+              <a:rPr lang="en-US" dirty="0" smtClean="0"/>
+              <a:t>common </a:t>
+            </a:r>
+            <a:r>
+              <a:rPr lang="en-US" dirty="0" smtClean="0"/>
+              <a:t>setup and workflow using </a:t>
             </a:r>
             <a:r>
               <a:rPr lang="en-US" dirty="0" err="1" smtClean="0"/>
@@ -7453,8 +7458,25 @@
           <a:p>
             <a:r>
               <a:rPr lang="en-US" dirty="0" smtClean="0"/>
-              <a:t>Coming soon is a chapter in the Ultrafast Design Methodology Guide (UG949) giving more details on these topics and this tutorial is the lunch and learn.</a:t>
-            </a:r>
+              <a:t>Chapter 2 </a:t>
+            </a:r>
+            <a:r>
+              <a:rPr lang="en-US" dirty="0" smtClean="0"/>
+              <a:t>in the Ultrafast Design Methodology Guide (UG949) </a:t>
+            </a:r>
+            <a:r>
+              <a:rPr lang="en-US" dirty="0" smtClean="0"/>
+              <a:t>has recently been published giving </a:t>
+            </a:r>
+            <a:r>
+              <a:rPr lang="en-US" dirty="0" smtClean="0"/>
+              <a:t>more details on these </a:t>
+            </a:r>
+            <a:r>
+              <a:rPr lang="en-US" dirty="0" smtClean="0"/>
+              <a:t>topics.</a:t>
+            </a:r>
+            <a:endParaRPr lang="en-US" dirty="0" smtClean="0"/>
           </a:p>
           <a:p>
             <a:endParaRPr lang="en-US" dirty="0"/>
@@ -7771,11 +7793,7 @@
             </a:r>
             <a:r>
               <a:rPr lang="en-US" baseline="0" dirty="0" smtClean="0"/>
-              <a:t> are all ASCII</a:t>
-            </a:r>
-            <a:r>
-              <a:rPr lang="en-US" baseline="0" dirty="0" smtClean="0"/>
-              <a:t>.</a:t>
+              <a:t> are all ASCII.</a:t>
             </a:r>
           </a:p>
           <a:p>
@@ -7959,12 +7977,12 @@
               <a:t>We’ve </a:t>
             </a:r>
             <a:r>
-              <a:rPr lang="en-US" dirty="0" err="1" smtClean="0"/>
-              <a:t>workd</a:t>
-            </a:r>
-            <a:r>
-              <a:rPr lang="en-US" dirty="0" smtClean="0"/>
-              <a:t> to drastically reduce the overall number of files in </a:t>
+              <a:rPr lang="en-US" dirty="0" smtClean="0"/>
+              <a:t>worked </a:t>
+            </a:r>
+            <a:r>
+              <a:rPr lang="en-US" dirty="0" smtClean="0"/>
+              <a:t>to drastically reduce the overall number of files in </a:t>
             </a:r>
             <a:r>
               <a:rPr lang="en-US" dirty="0" err="1" smtClean="0"/>
@@ -7972,7 +7990,23 @@
             </a:r>
             <a:r>
               <a:rPr lang="en-US" dirty="0" smtClean="0"/>
-              <a:t> IP.  On average the number of files has been reduced by 2/3rds.  </a:t>
+              <a:t> IP.  On average the number of files has been reduced by </a:t>
+            </a:r>
+            <a:r>
+              <a:rPr lang="en-US" dirty="0" smtClean="0"/>
+              <a:t>2/3.  We’ve </a:t>
+            </a:r>
+            <a:r>
+              <a:rPr lang="en-US" dirty="0" smtClean="0"/>
+              <a:t>also increased </a:t>
+            </a:r>
+            <a:r>
+              <a:rPr lang="en-US" dirty="0" smtClean="0"/>
+              <a:t>our </a:t>
+            </a:r>
+            <a:r>
+              <a:rPr lang="en-US" dirty="0" smtClean="0"/>
+              <a:t>testing and prioritization of revision control related issues.</a:t>
             </a:r>
           </a:p>
           <a:p>
@@ -7981,8 +8015,25 @@
           <a:p>
             <a:r>
               <a:rPr lang="en-US" dirty="0" smtClean="0"/>
-              <a:t>We’ve also increased out testing and prioritization of revision control related issues.</a:t>
-            </a:r>
+              <a:t>We have improved documentation, with a chapter focusing on rev. ctrl. Methodology in the ultrafast design methodology guide.  We </a:t>
+            </a:r>
+            <a:r>
+              <a:rPr lang="en-US" dirty="0" smtClean="0"/>
+              <a:t>have updated </a:t>
+            </a:r>
+            <a:r>
+              <a:rPr lang="en-US" dirty="0" smtClean="0"/>
+              <a:t>the </a:t>
+            </a:r>
+            <a:r>
+              <a:rPr lang="en-US" dirty="0" smtClean="0"/>
+              <a:t>quick take </a:t>
+            </a:r>
+            <a:r>
+              <a:rPr lang="en-US" dirty="0" smtClean="0"/>
+              <a:t>video which provides a good overview of our methodology recommendations.</a:t>
+            </a:r>
+            <a:endParaRPr lang="en-US" dirty="0" smtClean="0"/>
           </a:p>
           <a:p>
             <a:endParaRPr lang="en-US" dirty="0"/>
@@ -7990,24 +8041,19 @@
           <a:p>
             <a:r>
               <a:rPr lang="en-US" dirty="0" smtClean="0"/>
-              <a:t>We have improved documentation, with a chapter focusing on rev. ctrl. Methodology in the ultrafast </a:t>
-            </a:r>
-            <a:r>
-              <a:rPr lang="en-US" dirty="0" smtClean="0"/>
-              <a:t>design methodology </a:t>
-            </a:r>
-            <a:r>
-              <a:rPr lang="en-US" dirty="0" smtClean="0"/>
-              <a:t>guide.  We are updating the quick take videos and this lunch and learn tutorial will be made publically available as a tutorial for everyone.</a:t>
-            </a:r>
-          </a:p>
-          <a:p>
-            <a:endParaRPr lang="en-US" dirty="0"/>
-          </a:p>
-          <a:p>
-            <a:r>
-              <a:rPr lang="en-US" dirty="0" smtClean="0"/>
-              <a:t>In 2015.3, we will be rolling additional benefits with a project called “core container” that is effectively a zip archive of all the files in an IP so there will be a single self-contained file that needs to be managed with all needed sources inside.  We will be further working to reduce file counts by providing common IP RTL libraries in a central location chosen by the use to enable pre-compilation and reduction of redundant files across IP and with multiply instantiated IP.</a:t>
+              <a:t>In 2015.3, we will </a:t>
+            </a:r>
+            <a:r>
+              <a:rPr lang="en-US" dirty="0" smtClean="0"/>
+              <a:t>have additional benefits</a:t>
+            </a:r>
+            <a:r>
+              <a:rPr lang="en-US" dirty="0" smtClean="0"/>
+              <a:t> </a:t>
+            </a:r>
+            <a:r>
+              <a:rPr lang="en-US" dirty="0" smtClean="0"/>
+              <a:t>with a project called “core container” that is effectively a zip archive of all the files in an IP so there will be a single self-contained file that needs to be managed with all needed sources inside.  We will be further working to reduce file counts by providing common IP RTL libraries in a central location chosen by the use to enable pre-compilation and reduction of redundant files across IP and with multiply instantiated IP.</a:t>
             </a:r>
             <a:endParaRPr lang="en-US" dirty="0"/>
           </a:p>
@@ -8222,11 +8268,7 @@
           <a:p>
             <a:r>
               <a:rPr lang="en-US" dirty="0" smtClean="0"/>
-              <a:t>You need to set up a project (using scripts or interactively with the GUI) in the working directory (outside rev ctrl) and utilize remote sources (make sure </a:t>
-            </a:r>
-            <a:r>
-              <a:rPr lang="en-US" dirty="0" smtClean="0"/>
-              <a:t>to deselect the “import into project” option in the GUI).  The remote sources can point to the golden or master version of the repository or you can have an intermediate checkout version called a “staging area” where you will hold all your individual commitments prior to pushing them to all other users in the master or “golden” repository.  </a:t>
+              <a:t>You need to set up a project (using scripts or interactively with the GUI) in the working directory (outside rev ctrl) and utilize remote sources (make sure to deselect the “import into project” option in the GUI).  The remote sources can point to the golden or master version of the repository or you can have an intermediate checkout version called a “staging area” where you will hold all your individual commitments prior to pushing them to all other users in the master or “golden” repository.  </a:t>
             </a:r>
             <a:endParaRPr lang="en-US" dirty="0"/>
           </a:p>
@@ -8238,7 +8280,6 @@
               <a:rPr lang="en-US" dirty="0" smtClean="0"/>
               <a:t>Typically you will have a folder for each type of source in the revision control area to hold:  IP, IPI BDs, HLS, Scripts, Constraints, HDL sources etc…</a:t>
             </a:r>
-            <a:endParaRPr lang="en-US" dirty="0" smtClean="0"/>
           </a:p>
         </p:txBody>
       </p:sp>
@@ -8305,11 +8346,7 @@
             </a:r>
             <a:r>
               <a:rPr lang="en-US" baseline="0" dirty="0" smtClean="0"/>
-              <a:t> is how it would look.  Only the items inside the gold clouds are managed by the revision control system</a:t>
-            </a:r>
-            <a:r>
-              <a:rPr lang="en-US" baseline="0" dirty="0" smtClean="0"/>
-              <a:t>.  The </a:t>
+              <a:t> is how it would look.  Only the items inside the gold clouds are managed by the revision control system.  The </a:t>
             </a:r>
             <a:r>
               <a:rPr lang="en-US" baseline="0" dirty="0" err="1" smtClean="0"/>
@@ -8357,12 +8394,20 @@
               <a:t> script is primary recommendation) you need to understand that </a:t>
             </a:r>
             <a:r>
+              <a:rPr lang="en-US" dirty="0" err="1"/>
+              <a:t>V</a:t>
+            </a:r>
+            <a:r>
               <a:rPr lang="en-US" dirty="0" err="1" smtClean="0"/>
-              <a:t>vivado</a:t>
-            </a:r>
-            <a:r>
-              <a:rPr lang="en-US" dirty="0" smtClean="0"/>
-              <a:t> will try to recreate the project in the location of the </a:t>
+              <a:t>ivado</a:t>
+            </a:r>
+            <a:r>
+              <a:rPr lang="en-US" dirty="0" smtClean="0"/>
+              <a:t> </a:t>
+            </a:r>
+            <a:r>
+              <a:rPr lang="en-US" dirty="0" smtClean="0"/>
+              <a:t>will try to recreate the project in the location of the </a:t>
             </a:r>
             <a:r>
               <a:rPr lang="en-US" dirty="0" err="1" smtClean="0"/>
@@ -8370,11 +8415,11 @@
             </a:r>
             <a:r>
               <a:rPr lang="en-US" dirty="0" smtClean="0"/>
-              <a:t>.  So </a:t>
-            </a:r>
-            <a:r>
-              <a:rPr lang="en-US" dirty="0" smtClean="0"/>
-              <a:t>you must have write permission in the directory – </a:t>
+              <a:t>.  So you must have write permission in the directory </a:t>
+            </a:r>
+            <a:r>
+              <a:rPr lang="en-US" dirty="0" smtClean="0"/>
+              <a:t>where </a:t>
             </a:r>
             <a:r>
               <a:rPr lang="en-US" dirty="0" err="1" smtClean="0"/>
@@ -8382,7 +8427,11 @@
             </a:r>
             <a:r>
               <a:rPr lang="en-US" dirty="0" smtClean="0"/>
-              <a:t> will try to recreate the project.  It’s best if you copy the </a:t>
+              <a:t> </a:t>
+            </a:r>
+            <a:r>
+              <a:rPr lang="en-US" dirty="0" smtClean="0"/>
+              <a:t>will try to recreate the project.  It’s best if you copy the </a:t>
             </a:r>
             <a:r>
               <a:rPr lang="en-US" dirty="0" err="1" smtClean="0"/>
@@ -10683,7 +10732,19 @@
                 </a:solidFill>
                 <a:effectLst/>
               </a:rPr>
-              <a:t>June 2015</a:t>
+              <a:t>July </a:t>
+            </a:r>
+            <a:r>
+              <a:rPr lang="en-US" sz="2800" b="0" kern="0" dirty="0" smtClean="0">
+                <a:solidFill>
+                  <a:srgbClr val="000000">
+                    <a:lumMod val="75000"/>
+                    <a:lumOff val="25000"/>
+                  </a:srgbClr>
+                </a:solidFill>
+                <a:effectLst/>
+              </a:rPr>
+              <a:t>2015</a:t>
             </a:r>
             <a:endParaRPr sz="2000" b="0" kern="0" dirty="0">
               <a:solidFill>
@@ -12211,11 +12272,7 @@
             </a:r>
             <a:r>
               <a:rPr lang="en-US" sz="1800" dirty="0" smtClean="0"/>
-              <a:t> script or </a:t>
-            </a:r>
-            <a:r>
-              <a:rPr lang="en-US" sz="1800" dirty="0" smtClean="0"/>
-              <a:t>just </a:t>
+              <a:t> script or just </a:t>
             </a:r>
             <a:r>
               <a:rPr lang="en-US" sz="1800" dirty="0"/>
@@ -22793,14 +22850,31 @@
           <a:p>
             <a:r>
               <a:rPr lang="en-US" dirty="0" smtClean="0"/>
-              <a:t>Available documentation / materials coming soon!</a:t>
-            </a:r>
-          </a:p>
-          <a:p>
-            <a:pPr lvl="1"/>
-            <a:r>
-              <a:rPr lang="en-US" dirty="0" smtClean="0"/>
-              <a:t>Chapter 2 in UG949, Quick Take Video, Lunch and Learn</a:t>
+              <a:t>Available </a:t>
+            </a:r>
+            <a:r>
+              <a:rPr lang="en-US" dirty="0" smtClean="0"/>
+              <a:t>Now:  </a:t>
+            </a:r>
+            <a:r>
+              <a:rPr lang="en-US" dirty="0" smtClean="0"/>
+              <a:t>Chapter </a:t>
+            </a:r>
+            <a:r>
+              <a:rPr lang="en-US" dirty="0" smtClean="0"/>
+              <a:t>2 in </a:t>
+            </a:r>
+            <a:r>
+              <a:rPr lang="en-US" dirty="0" smtClean="0"/>
+              <a:t>UG949</a:t>
+            </a:r>
+            <a:r>
+              <a:rPr lang="en-US" dirty="0"/>
+              <a:t> C</a:t>
+            </a:r>
+            <a:r>
+              <a:rPr lang="en-US" dirty="0" smtClean="0"/>
+              <a:t>overs Revision Control</a:t>
             </a:r>
             <a:endParaRPr lang="en-US" dirty="0"/>
           </a:p>
@@ -23301,37 +23375,6 @@
                                           <p:spTgt spid="2">
                                             <p:txEl>
                                               <p:pRg st="8" end="8"/>
-                                            </p:txEl>
-                                          </p:spTgt>
-                                        </p:tgtEl>
-                                        <p:attrNameLst>
-                                          <p:attrName>style.visibility</p:attrName>
-                                        </p:attrNameLst>
-                                      </p:cBhvr>
-                                      <p:to>
-                                        <p:strVal val="visible"/>
-                                      </p:to>
-                                    </p:set>
-                                  </p:childTnLst>
-                                </p:cTn>
-                              </p:par>
-                              <p:par>
-                                <p:cTn id="25" presetID="1" presetClass="entr" presetSubtype="0" fill="hold" nodeType="withEffect">
-                                  <p:stCondLst>
-                                    <p:cond delay="0"/>
-                                  </p:stCondLst>
-                                  <p:childTnLst>
-                                    <p:set>
-                                      <p:cBhvr>
-                                        <p:cTn id="26" dur="1" fill="hold">
-                                          <p:stCondLst>
-                                            <p:cond delay="0"/>
-                                          </p:stCondLst>
-                                        </p:cTn>
-                                        <p:tgtEl>
-                                          <p:spTgt spid="2">
-                                            <p:txEl>
-                                              <p:pRg st="9" end="9"/>
                                             </p:txEl>
                                           </p:spTgt>
                                         </p:tgtEl>
@@ -25217,7 +25260,11 @@
           <a:p>
             <a:r>
               <a:rPr lang="en-US" dirty="0" smtClean="0"/>
-              <a:t>Updates to Chapter 2 in the </a:t>
+              <a:t>Updated Chapter </a:t>
+            </a:r>
+            <a:r>
+              <a:rPr lang="en-US" dirty="0" smtClean="0"/>
+              <a:t>2 in the </a:t>
             </a:r>
             <a:r>
               <a:rPr lang="en-US" dirty="0" err="1" smtClean="0"/>
@@ -25225,20 +25272,42 @@
             </a:r>
             <a:r>
               <a:rPr lang="en-US" dirty="0" smtClean="0"/>
-              <a:t> DMG coming June 8th!</a:t>
-            </a:r>
-          </a:p>
-          <a:p>
-            <a:r>
-              <a:rPr lang="en-US" dirty="0" smtClean="0"/>
-              <a:t>Updated Revision Control Quick Take Video coming soon!</a:t>
-            </a:r>
-          </a:p>
-          <a:p>
-            <a:r>
-              <a:rPr lang="en-US" dirty="0" smtClean="0"/>
-              <a:t>New Lunch and Learn coming soon!</a:t>
-            </a:r>
+              <a:t> DMG </a:t>
+            </a:r>
+            <a:r>
+              <a:rPr lang="en-US" dirty="0" smtClean="0"/>
+              <a:t>delivered</a:t>
+            </a:r>
+            <a:r>
+              <a:rPr lang="en-US" dirty="0" smtClean="0"/>
+              <a:t> </a:t>
+            </a:r>
+            <a:r>
+              <a:rPr lang="en-US" dirty="0" smtClean="0"/>
+              <a:t>June 8th</a:t>
+            </a:r>
+            <a:r>
+              <a:rPr lang="en-US" dirty="0" smtClean="0"/>
+              <a:t>!</a:t>
+            </a:r>
+          </a:p>
+          <a:p>
+            <a:endParaRPr lang="en-US" dirty="0" smtClean="0"/>
+          </a:p>
+          <a:p>
+            <a:r>
+              <a:rPr lang="en-US" dirty="0" smtClean="0"/>
+              <a:t>Updated Revision Control Quick Take Video </a:t>
+            </a:r>
+            <a:r>
+              <a:rPr lang="en-US" dirty="0" smtClean="0"/>
+              <a:t>now live</a:t>
+            </a:r>
+            <a:r>
+              <a:rPr lang="en-US" dirty="0" smtClean="0"/>
+              <a:t>!</a:t>
+            </a:r>
+            <a:endParaRPr lang="en-US" dirty="0" smtClean="0"/>
           </a:p>
           <a:p>
             <a:pPr marL="0" indent="0">
@@ -28155,6 +28224,21 @@
 </file>
 
 <file path=customXml/item1.xml><?xml version="1.0" encoding="utf-8"?>
+<p:properties xmlns:p="http://schemas.microsoft.com/office/2006/metadata/properties" xmlns:xsi="http://www.w3.org/2001/XMLSchema-instance" xmlns:pc="http://schemas.microsoft.com/office/infopath/2007/PartnerControls">
+  <documentManagement/>
+</p:properties>
+</file>
+
+<file path=customXml/item2.xml><?xml version="1.0" encoding="utf-8"?>
+<?mso-contentType ?>
+<FormTemplates xmlns="http://schemas.microsoft.com/sharepoint/v3/contenttype/forms">
+  <Display>DocumentLibraryForm</Display>
+  <Edit>DocumentLibraryForm</Edit>
+  <New>DocumentLibraryForm</New>
+</FormTemplates>
+</file>
+
+<file path=customXml/item3.xml><?xml version="1.0" encoding="utf-8"?>
 <ct:contentTypeSchema xmlns:ct="http://schemas.microsoft.com/office/2006/metadata/contentType" xmlns:ma="http://schemas.microsoft.com/office/2006/metadata/properties/metaAttributes" ct:_="" ma:_="" ma:contentTypeName="Document" ma:contentTypeID="0x010100865745BEB8D7C34BA25656CA096E1348" ma:contentTypeVersion="0" ma:contentTypeDescription="Create a new document." ma:contentTypeScope="" ma:versionID="f10c673594dd0a262808b1d3dc428089">
   <xsd:schema xmlns:xsd="http://www.w3.org/2001/XMLSchema" xmlns:xs="http://www.w3.org/2001/XMLSchema" xmlns:p="http://schemas.microsoft.com/office/2006/metadata/properties" targetNamespace="http://schemas.microsoft.com/office/2006/metadata/properties" ma:root="true" ma:fieldsID="c64490b4aec6201516c3a874156f37b2">
     <xsd:element name="properties">
@@ -28268,22 +28352,30 @@
 </ct:contentTypeSchema>
 </file>
 
-<file path=customXml/item2.xml><?xml version="1.0" encoding="utf-8"?>
-<?mso-contentType ?>
-<FormTemplates xmlns="http://schemas.microsoft.com/sharepoint/v3/contenttype/forms">
-  <Display>DocumentLibraryForm</Display>
-  <Edit>DocumentLibraryForm</Edit>
-  <New>DocumentLibraryForm</New>
-</FormTemplates>
+<file path=customXml/itemProps1.xml><?xml version="1.0" encoding="utf-8"?>
+<ds:datastoreItem xmlns:ds="http://schemas.openxmlformats.org/officeDocument/2006/customXml" ds:itemID="{0A886E37-D8EC-4D3B-9AA4-97C26A5CAE7C}">
+  <ds:schemaRefs>
+    <ds:schemaRef ds:uri="http://purl.org/dc/dcmitype/"/>
+    <ds:schemaRef ds:uri="http://schemas.openxmlformats.org/package/2006/metadata/core-properties"/>
+    <ds:schemaRef ds:uri="http://purl.org/dc/elements/1.1/"/>
+    <ds:schemaRef ds:uri="http://schemas.microsoft.com/office/infopath/2007/PartnerControls"/>
+    <ds:schemaRef ds:uri="http://schemas.microsoft.com/office/2006/documentManagement/types"/>
+    <ds:schemaRef ds:uri="http://schemas.microsoft.com/office/2006/metadata/properties"/>
+    <ds:schemaRef ds:uri="http://www.w3.org/XML/1998/namespace"/>
+    <ds:schemaRef ds:uri="http://purl.org/dc/terms/"/>
+  </ds:schemaRefs>
+</ds:datastoreItem>
 </file>
 
-<file path=customXml/item3.xml><?xml version="1.0" encoding="utf-8"?>
-<p:properties xmlns:p="http://schemas.microsoft.com/office/2006/metadata/properties" xmlns:xsi="http://www.w3.org/2001/XMLSchema-instance" xmlns:pc="http://schemas.microsoft.com/office/infopath/2007/PartnerControls">
-  <documentManagement/>
-</p:properties>
+<file path=customXml/itemProps2.xml><?xml version="1.0" encoding="utf-8"?>
+<ds:datastoreItem xmlns:ds="http://schemas.openxmlformats.org/officeDocument/2006/customXml" ds:itemID="{30EBFC54-C7AE-455C-9271-6C115E2357AC}">
+  <ds:schemaRefs>
+    <ds:schemaRef ds:uri="http://schemas.microsoft.com/sharepoint/v3/contenttype/forms"/>
+  </ds:schemaRefs>
+</ds:datastoreItem>
 </file>
 
-<file path=customXml/itemProps1.xml><?xml version="1.0" encoding="utf-8"?>
+<file path=customXml/itemProps3.xml><?xml version="1.0" encoding="utf-8"?>
 <ds:datastoreItem xmlns:ds="http://schemas.openxmlformats.org/officeDocument/2006/customXml" ds:itemID="{E57AF8F8-8EA4-4505-925A-F0F079C7B96D}">
   <ds:schemaRefs>
     <ds:schemaRef ds:uri="http://schemas.microsoft.com/office/2006/metadata/contentType"/>
@@ -28297,27 +28389,4 @@
     <ds:schemaRef ds:uri="http://schemas.microsoft.com/office/infopath/2007/PartnerControls"/>
   </ds:schemaRefs>
 </ds:datastoreItem>
-</file>
-
-<file path=customXml/itemProps2.xml><?xml version="1.0" encoding="utf-8"?>
-<ds:datastoreItem xmlns:ds="http://schemas.openxmlformats.org/officeDocument/2006/customXml" ds:itemID="{30EBFC54-C7AE-455C-9271-6C115E2357AC}">
-  <ds:schemaRefs>
-    <ds:schemaRef ds:uri="http://schemas.microsoft.com/sharepoint/v3/contenttype/forms"/>
-  </ds:schemaRefs>
-</ds:datastoreItem>
-</file>
-
-<file path=customXml/itemProps3.xml><?xml version="1.0" encoding="utf-8"?>
-<ds:datastoreItem xmlns:ds="http://schemas.openxmlformats.org/officeDocument/2006/customXml" ds:itemID="{0A886E37-D8EC-4D3B-9AA4-97C26A5CAE7C}">
-  <ds:schemaRefs>
-    <ds:schemaRef ds:uri="http://purl.org/dc/dcmitype/"/>
-    <ds:schemaRef ds:uri="http://schemas.openxmlformats.org/package/2006/metadata/core-properties"/>
-    <ds:schemaRef ds:uri="http://purl.org/dc/elements/1.1/"/>
-    <ds:schemaRef ds:uri="http://schemas.microsoft.com/office/infopath/2007/PartnerControls"/>
-    <ds:schemaRef ds:uri="http://schemas.microsoft.com/office/2006/documentManagement/types"/>
-    <ds:schemaRef ds:uri="http://schemas.microsoft.com/office/2006/metadata/properties"/>
-    <ds:schemaRef ds:uri="http://www.w3.org/XML/1998/namespace"/>
-    <ds:schemaRef ds:uri="http://purl.org/dc/terms/"/>
-  </ds:schemaRefs>
-</ds:datastoreItem>
 </file>
</xml_diff>

<commit_message>
updated doc for 2017.1 recommendations
</commit_message>
<xml_diff>
--- a/doc/versionControl.pptx
+++ b/doc/versionControl.pptx
@@ -387,11 +387,11 @@
         </c:dLbls>
         <c:bubbleScale val="100"/>
         <c:showNegBubbles val="0"/>
-        <c:axId val="612392544"/>
-        <c:axId val="612392936"/>
+        <c:axId val="500103528"/>
+        <c:axId val="500103920"/>
       </c:bubbleChart>
       <c:valAx>
-        <c:axId val="612392544"/>
+        <c:axId val="500103528"/>
         <c:scaling>
           <c:orientation val="minMax"/>
         </c:scaling>
@@ -500,12 +500,12 @@
             <a:endParaRPr lang="en-US"/>
           </a:p>
         </c:txPr>
-        <c:crossAx val="612392936"/>
+        <c:crossAx val="500103920"/>
         <c:crosses val="autoZero"/>
         <c:crossBetween val="midCat"/>
       </c:valAx>
       <c:valAx>
-        <c:axId val="612392936"/>
+        <c:axId val="500103920"/>
         <c:scaling>
           <c:orientation val="minMax"/>
         </c:scaling>
@@ -614,7 +614,7 @@
             <a:endParaRPr lang="en-US"/>
           </a:p>
         </c:txPr>
-        <c:crossAx val="612392544"/>
+        <c:crossAx val="500103528"/>
         <c:crosses val="autoZero"/>
         <c:crossBetween val="midCat"/>
       </c:valAx>
@@ -4591,7 +4591,7 @@
             <a:fld id="{3603A3DC-285A-48EF-A6A9-13284B292DDB}" type="datetimeFigureOut">
               <a:rPr lang="en-US" smtClean="0"/>
               <a:pPr/>
-              <a:t>2/16/2017</a:t>
+              <a:t>3/15/2017</a:t>
             </a:fld>
             <a:endParaRPr lang="en-US" dirty="0"/>
           </a:p>
@@ -10660,19 +10660,7 @@
                 </a:solidFill>
                 <a:effectLst/>
               </a:rPr>
-              <a:t>February</a:t>
-            </a:r>
-            <a:r>
-              <a:rPr lang="en-US" sz="2800" b="0" kern="0" dirty="0" smtClean="0">
-                <a:solidFill>
-                  <a:srgbClr val="000000">
-                    <a:lumMod val="75000"/>
-                    <a:lumOff val="25000"/>
-                  </a:srgbClr>
-                </a:solidFill>
-                <a:effectLst/>
-              </a:rPr>
-              <a:t> 2017</a:t>
+              <a:t>February 2017</a:t>
             </a:r>
             <a:endParaRPr sz="2000" b="0" kern="0" dirty="0">
               <a:solidFill>
@@ -12179,7 +12167,7 @@
         <p:spPr>
           <a:xfrm>
             <a:off x="457199" y="1026270"/>
-            <a:ext cx="5654637" cy="5305082"/>
+            <a:ext cx="5836823" cy="5305082"/>
           </a:xfrm>
         </p:spPr>
         <p:txBody>
@@ -12278,8 +12266,39 @@
             </a:r>
             <a:r>
               <a:rPr lang="en-US" sz="1600" dirty="0" smtClean="0"/>
-              <a:t> the IP was created with</a:t>
-            </a:r>
+              <a:t> the IP was created </a:t>
+            </a:r>
+            <a:r>
+              <a:rPr lang="en-US" sz="1600" dirty="0" smtClean="0"/>
+              <a:t>with</a:t>
+            </a:r>
+          </a:p>
+          <a:p>
+            <a:pPr lvl="1"/>
+            <a:r>
+              <a:rPr lang="en-US" sz="1600" dirty="0" smtClean="0"/>
+              <a:t>Do not revision control the </a:t>
+            </a:r>
+            <a:r>
+              <a:rPr lang="en-US" sz="1600" dirty="0" err="1" smtClean="0"/>
+              <a:t>dcp</a:t>
+            </a:r>
+            <a:r>
+              <a:rPr lang="en-US" sz="1600" dirty="0" smtClean="0"/>
+              <a:t> standalone</a:t>
+            </a:r>
+          </a:p>
+          <a:p>
+            <a:pPr lvl="2"/>
+            <a:r>
+              <a:rPr lang="en-US" sz="1400" dirty="0" smtClean="0"/>
+              <a:t>Constraints and memory programming information </a:t>
+            </a:r>
+            <a:r>
+              <a:rPr lang="en-US" sz="1400" dirty="0" smtClean="0"/>
+              <a:t>will not work</a:t>
+            </a:r>
+            <a:endParaRPr lang="en-US" sz="1400" dirty="0" smtClean="0"/>
           </a:p>
           <a:p>
             <a:endParaRPr lang="en-US" sz="1800" dirty="0" smtClean="0"/>
@@ -14434,8 +14453,8 @@
         </p:nvSpPr>
         <p:spPr>
           <a:xfrm>
-            <a:off x="280416" y="1217222"/>
-            <a:ext cx="8863584" cy="5359791"/>
+            <a:off x="280416" y="925023"/>
+            <a:ext cx="8863584" cy="5520717"/>
           </a:xfrm>
         </p:spPr>
         <p:txBody>
@@ -14444,14 +14463,41 @@
           <a:p>
             <a:r>
               <a:rPr lang="en-US" dirty="0" smtClean="0"/>
-              <a:t>Team Design – Multiple Designers Modifying Block Diagram</a:t>
+              <a:t>Team Design – Multiple Designers </a:t>
+            </a:r>
+            <a:r>
+              <a:rPr lang="en-US" dirty="0" smtClean="0"/>
+              <a:t>Modify </a:t>
+            </a:r>
+            <a:r>
+              <a:rPr lang="en-US" dirty="0" smtClean="0"/>
+              <a:t>Block Diagram</a:t>
             </a:r>
           </a:p>
           <a:p>
             <a:pPr lvl="1"/>
             <a:r>
               <a:rPr lang="en-US" dirty="0" smtClean="0"/>
-              <a:t>Review changes in a graphical change log to see before/after changes</a:t>
+              <a:t>Review changes in a graphical change log to see before/after </a:t>
+            </a:r>
+            <a:r>
+              <a:rPr lang="en-US" dirty="0" smtClean="0"/>
+              <a:t>changes</a:t>
+            </a:r>
+          </a:p>
+          <a:p>
+            <a:pPr lvl="2"/>
+            <a:r>
+              <a:rPr lang="en-US" dirty="0" smtClean="0"/>
+              <a:t>GitHub and most revision control tools as well as </a:t>
+            </a:r>
+            <a:r>
+              <a:rPr lang="en-US" dirty="0" err="1" smtClean="0"/>
+              <a:t>linux</a:t>
+            </a:r>
+            <a:r>
+              <a:rPr lang="en-US" dirty="0" smtClean="0"/>
+              <a:t> have tools for this</a:t>
             </a:r>
             <a:endParaRPr lang="en-US" dirty="0"/>
           </a:p>
@@ -14475,11 +14521,12 @@
             </a:r>
             <a:r>
               <a:rPr lang="en-US" dirty="0" smtClean="0"/>
-              <a:t> to make this easier</a:t>
-            </a:r>
-          </a:p>
-          <a:p>
-            <a:pPr lvl="1"/>
+              <a:t> to make this </a:t>
+            </a:r>
+            <a:r>
+              <a:rPr lang="en-US" dirty="0" smtClean="0"/>
+              <a:t>easier</a:t>
+            </a:r>
             <a:endParaRPr lang="en-US" dirty="0" smtClean="0"/>
           </a:p>
           <a:p>
@@ -14500,12 +14547,12 @@
               <a:t>User hierarchy wrap </a:t>
             </a:r>
             <a:r>
-              <a:rPr lang="en-US" dirty="0" err="1" smtClean="0"/>
-              <a:t>abour</a:t>
-            </a:r>
-            <a:r>
-              <a:rPr lang="en-US" dirty="0" smtClean="0"/>
-              <a:t> a block you wish to share</a:t>
+              <a:rPr lang="en-US" dirty="0" smtClean="0"/>
+              <a:t>around </a:t>
+            </a:r>
+            <a:r>
+              <a:rPr lang="en-US" dirty="0" smtClean="0"/>
+              <a:t>a block you wish to share</a:t>
             </a:r>
             <a:endParaRPr lang="en-US" dirty="0"/>
           </a:p>
@@ -14551,8 +14598,71 @@
             </a:r>
             <a:r>
               <a:rPr lang="en-US" dirty="0" smtClean="0"/>
-              <a:t> creates 1 proc per hierarchy)</a:t>
-            </a:r>
+              <a:t> creates 1 proc per hierarchy</a:t>
+            </a:r>
+            <a:r>
+              <a:rPr lang="en-US" dirty="0" smtClean="0"/>
+              <a:t>)</a:t>
+            </a:r>
+            <a:endParaRPr lang="en-US" dirty="0"/>
+          </a:p>
+          <a:p>
+            <a:r>
+              <a:rPr lang="en-US" dirty="0" smtClean="0"/>
+              <a:t>IP</a:t>
+            </a:r>
+          </a:p>
+          <a:p>
+            <a:pPr lvl="1"/>
+            <a:r>
+              <a:rPr lang="en-US" dirty="0" smtClean="0"/>
+              <a:t>Do not extract the RTL or use just the </a:t>
+            </a:r>
+            <a:r>
+              <a:rPr lang="en-US" dirty="0" err="1" smtClean="0"/>
+              <a:t>dcp</a:t>
+            </a:r>
+            <a:r>
+              <a:rPr lang="en-US" dirty="0" smtClean="0"/>
+              <a:t> standalone</a:t>
+            </a:r>
+          </a:p>
+          <a:p>
+            <a:pPr lvl="2"/>
+            <a:r>
+              <a:rPr lang="en-US" dirty="0" smtClean="0"/>
+              <a:t>This breaks memory programming information and loses the original IP constraints</a:t>
+            </a:r>
+          </a:p>
+          <a:p>
+            <a:pPr lvl="2"/>
+            <a:r>
+              <a:rPr lang="en-US" dirty="0" smtClean="0"/>
+              <a:t>Use the xci or xcix – preferably fully generated</a:t>
+            </a:r>
+          </a:p>
+          <a:p>
+            <a:pPr lvl="2"/>
+            <a:r>
+              <a:rPr lang="en-US" dirty="0" smtClean="0"/>
+              <a:t>2017.1 will give critical warnings for standalone </a:t>
+            </a:r>
+            <a:r>
+              <a:rPr lang="en-US" dirty="0" err="1" smtClean="0"/>
+              <a:t>dcps</a:t>
+            </a:r>
+            <a:r>
+              <a:rPr lang="en-US" dirty="0" smtClean="0"/>
+              <a:t> from Xilinx IP</a:t>
+            </a:r>
+          </a:p>
+          <a:p>
+            <a:pPr lvl="1"/>
+            <a:r>
+              <a:rPr lang="en-US" dirty="0" smtClean="0"/>
+              <a:t>Treat the BD as a giant, complex IP – don’t try and manage the pieces </a:t>
+            </a:r>
+            <a:endParaRPr lang="en-US" dirty="0" smtClean="0"/>
           </a:p>
         </p:txBody>
       </p:sp>
@@ -25387,11 +25497,15 @@
             </a:r>
             <a:r>
               <a:rPr lang="en-US" dirty="0" err="1" smtClean="0"/>
-              <a:t>UltraFast</a:t>
-            </a:r>
-            <a:r>
-              <a:rPr lang="en-US" dirty="0" smtClean="0"/>
-              <a:t> DMG delivered!</a:t>
+              <a:t>UltraFAST</a:t>
+            </a:r>
+            <a:r>
+              <a:rPr lang="en-US" dirty="0" smtClean="0"/>
+              <a:t> Methodology Guide </a:t>
+            </a:r>
+            <a:r>
+              <a:rPr lang="en-US" dirty="0" smtClean="0"/>
+              <a:t>delivered!</a:t>
             </a:r>
           </a:p>
           <a:p>
@@ -25399,7 +25513,6 @@
               <a:rPr lang="en-US" dirty="0" smtClean="0"/>
               <a:t>2015.X</a:t>
             </a:r>
-            <a:endParaRPr lang="en-US" dirty="0" smtClean="0"/>
           </a:p>
           <a:p>
             <a:pPr lvl="1"/>
@@ -25420,13 +25533,8 @@
             <a:pPr lvl="1"/>
             <a:r>
               <a:rPr lang="en-US" dirty="0" smtClean="0"/>
-              <a:t>Compared to 2014.1 the average number of files per IP is about </a:t>
-            </a:r>
-            <a:r>
-              <a:rPr lang="en-US" dirty="0" smtClean="0"/>
-              <a:t>1/3</a:t>
-            </a:r>
-            <a:endParaRPr lang="en-US" dirty="0" smtClean="0"/>
+              <a:t>Compared to 2014.1 the average number of files per IP is about 1/3</a:t>
+            </a:r>
           </a:p>
           <a:p>
             <a:pPr lvl="1"/>
@@ -25496,7 +25604,6 @@
               <a:rPr lang="en-US" dirty="0" smtClean="0"/>
               <a:t>Ability to precompile common simulation libraries</a:t>
             </a:r>
-            <a:endParaRPr lang="en-US" dirty="0" smtClean="0"/>
           </a:p>
           <a:p>
             <a:endParaRPr lang="en-US" dirty="0" smtClean="0"/>
@@ -28364,18 +28471,18 @@
 </file>
 
 <file path=customXml/item1.xml><?xml version="1.0" encoding="utf-8"?>
+<p:properties xmlns:p="http://schemas.microsoft.com/office/2006/metadata/properties" xmlns:xsi="http://www.w3.org/2001/XMLSchema-instance" xmlns:pc="http://schemas.microsoft.com/office/infopath/2007/PartnerControls">
+  <documentManagement/>
+</p:properties>
+</file>
+
+<file path=customXml/item2.xml><?xml version="1.0" encoding="utf-8"?>
 <?mso-contentType ?>
 <FormTemplates xmlns="http://schemas.microsoft.com/sharepoint/v3/contenttype/forms">
   <Display>DocumentLibraryForm</Display>
   <Edit>DocumentLibraryForm</Edit>
   <New>DocumentLibraryForm</New>
 </FormTemplates>
-</file>
-
-<file path=customXml/item2.xml><?xml version="1.0" encoding="utf-8"?>
-<p:properties xmlns:p="http://schemas.microsoft.com/office/2006/metadata/properties" xmlns:xsi="http://www.w3.org/2001/XMLSchema-instance" xmlns:pc="http://schemas.microsoft.com/office/infopath/2007/PartnerControls">
-  <documentManagement/>
-</p:properties>
 </file>
 
 <file path=customXml/item3.xml><?xml version="1.0" encoding="utf-8"?>
@@ -28493,14 +28600,6 @@
 </file>
 
 <file path=customXml/itemProps1.xml><?xml version="1.0" encoding="utf-8"?>
-<ds:datastoreItem xmlns:ds="http://schemas.openxmlformats.org/officeDocument/2006/customXml" ds:itemID="{30EBFC54-C7AE-455C-9271-6C115E2357AC}">
-  <ds:schemaRefs>
-    <ds:schemaRef ds:uri="http://schemas.microsoft.com/sharepoint/v3/contenttype/forms"/>
-  </ds:schemaRefs>
-</ds:datastoreItem>
-</file>
-
-<file path=customXml/itemProps2.xml><?xml version="1.0" encoding="utf-8"?>
 <ds:datastoreItem xmlns:ds="http://schemas.openxmlformats.org/officeDocument/2006/customXml" ds:itemID="{0A886E37-D8EC-4D3B-9AA4-97C26A5CAE7C}">
   <ds:schemaRefs>
     <ds:schemaRef ds:uri="http://purl.org/dc/dcmitype/"/>
@@ -28511,6 +28610,14 @@
     <ds:schemaRef ds:uri="http://schemas.microsoft.com/office/2006/metadata/properties"/>
     <ds:schemaRef ds:uri="http://www.w3.org/XML/1998/namespace"/>
     <ds:schemaRef ds:uri="http://purl.org/dc/terms/"/>
+  </ds:schemaRefs>
+</ds:datastoreItem>
+</file>
+
+<file path=customXml/itemProps2.xml><?xml version="1.0" encoding="utf-8"?>
+<ds:datastoreItem xmlns:ds="http://schemas.openxmlformats.org/officeDocument/2006/customXml" ds:itemID="{30EBFC54-C7AE-455C-9271-6C115E2357AC}">
+  <ds:schemaRefs>
+    <ds:schemaRef ds:uri="http://schemas.microsoft.com/sharepoint/v3/contenttype/forms"/>
   </ds:schemaRefs>
 </ds:datastoreItem>
 </file>

</xml_diff>